<commit_message>
ajout page plan de communication dans le document pdf presentation Menu-Maker et dans la version PPtx
</commit_message>
<xml_diff>
--- a/Présentation+Soufiane.pptx
+++ b/Présentation+Soufiane.pptx
@@ -16,15 +16,16 @@
     <p:sldId id="274" r:id="rId8"/>
     <p:sldId id="260" r:id="rId9"/>
     <p:sldId id="267" r:id="rId10"/>
-    <p:sldId id="262" r:id="rId11"/>
-    <p:sldId id="272" r:id="rId12"/>
-    <p:sldId id="271" r:id="rId13"/>
-    <p:sldId id="263" r:id="rId14"/>
-    <p:sldId id="276" r:id="rId15"/>
-    <p:sldId id="275" r:id="rId16"/>
-    <p:sldId id="273" r:id="rId17"/>
-    <p:sldId id="278" r:id="rId18"/>
-    <p:sldId id="265" r:id="rId19"/>
+    <p:sldId id="279" r:id="rId11"/>
+    <p:sldId id="262" r:id="rId12"/>
+    <p:sldId id="272" r:id="rId13"/>
+    <p:sldId id="271" r:id="rId14"/>
+    <p:sldId id="263" r:id="rId15"/>
+    <p:sldId id="276" r:id="rId16"/>
+    <p:sldId id="275" r:id="rId17"/>
+    <p:sldId id="273" r:id="rId18"/>
+    <p:sldId id="278" r:id="rId19"/>
+    <p:sldId id="265" r:id="rId20"/>
   </p:sldIdLst>
   <p:sldSz cx="9144000" cy="5143500" type="screen16x9"/>
   <p:notesSz cx="6858000" cy="9144000"/>
@@ -834,7 +835,7 @@
       </p:grpSpPr>
       <p:sp>
         <p:nvSpPr>
-          <p:cNvPr id="81" name="Google Shape;81;g20c4033f8d1_0_22:notes"/>
+          <p:cNvPr id="98" name="Google Shape;98;g20c4033f8d1_0_34:notes"/>
           <p:cNvSpPr>
             <a:spLocks noGrp="1" noEditPoints="1"/>
           </p:cNvSpPr>
@@ -880,7 +881,7 @@
       </p:sp>
       <p:sp>
         <p:nvSpPr>
-          <p:cNvPr id="82" name="Google Shape;82;g20c4033f8d1_0_22:notes"/>
+          <p:cNvPr id="99" name="Google Shape;99;g20c4033f8d1_0_34:notes"/>
           <p:cNvSpPr>
             <a:spLocks noGrp="1" noEditPoints="1"/>
           </p:cNvSpPr>
@@ -942,7 +943,7 @@
       </p:grpSpPr>
       <p:sp>
         <p:nvSpPr>
-          <p:cNvPr id="98" name="Google Shape;98;g20c4033f8d1_0_34:notes"/>
+          <p:cNvPr id="81" name="Google Shape;81;g20c4033f8d1_0_22:notes"/>
           <p:cNvSpPr>
             <a:spLocks noGrp="1" noEditPoints="1"/>
           </p:cNvSpPr>
@@ -988,7 +989,7 @@
       </p:sp>
       <p:sp>
         <p:nvSpPr>
-          <p:cNvPr id="99" name="Google Shape;99;g20c4033f8d1_0_34:notes"/>
+          <p:cNvPr id="82" name="Google Shape;82;g20c4033f8d1_0_22:notes"/>
           <p:cNvSpPr>
             <a:spLocks noGrp="1" noEditPoints="1"/>
           </p:cNvSpPr>
@@ -1050,7 +1051,7 @@
       </p:grpSpPr>
       <p:sp>
         <p:nvSpPr>
-          <p:cNvPr id="108" name="Google Shape;108;g218b606cc07_1_8:notes"/>
+          <p:cNvPr id="98" name="Google Shape;98;g20c4033f8d1_0_34:notes"/>
           <p:cNvSpPr>
             <a:spLocks noGrp="1" noEditPoints="1"/>
           </p:cNvSpPr>
@@ -1096,7 +1097,7 @@
       </p:sp>
       <p:sp>
         <p:nvSpPr>
-          <p:cNvPr id="109" name="Google Shape;109;g218b606cc07_1_8:notes"/>
+          <p:cNvPr id="99" name="Google Shape;99;g20c4033f8d1_0_34:notes"/>
           <p:cNvSpPr>
             <a:spLocks noGrp="1" noEditPoints="1"/>
           </p:cNvSpPr>
@@ -1158,7 +1159,7 @@
       </p:grpSpPr>
       <p:sp>
         <p:nvSpPr>
-          <p:cNvPr id="81" name="Google Shape;81;g20c4033f8d1_0_22:notes"/>
+          <p:cNvPr id="108" name="Google Shape;108;g218b606cc07_1_8:notes"/>
           <p:cNvSpPr>
             <a:spLocks noGrp="1" noEditPoints="1"/>
           </p:cNvSpPr>
@@ -1204,7 +1205,7 @@
       </p:sp>
       <p:sp>
         <p:nvSpPr>
-          <p:cNvPr id="82" name="Google Shape;82;g20c4033f8d1_0_22:notes"/>
+          <p:cNvPr id="109" name="Google Shape;109;g218b606cc07_1_8:notes"/>
           <p:cNvSpPr>
             <a:spLocks noGrp="1" noEditPoints="1"/>
           </p:cNvSpPr>
@@ -1590,6 +1591,114 @@
       </p:grpSpPr>
       <p:sp>
         <p:nvSpPr>
+          <p:cNvPr id="81" name="Google Shape;81;g20c4033f8d1_0_22:notes"/>
+          <p:cNvSpPr>
+            <a:spLocks noGrp="1" noEditPoints="1"/>
+          </p:cNvSpPr>
+          <p:nvPr>
+            <p:ph type="sldImg" idx="2"/>
+          </p:nvPr>
+        </p:nvSpPr>
+        <p:spPr>
+          <a:xfrm>
+            <a:off x="381300" y="685800"/>
+            <a:ext cx="6096000" cy="3429000"/>
+          </a:xfrm>
+          <a:custGeom>
+            <a:avLst/>
+            <a:rect l="l" t="t" r="r" b="b"/>
+            <a:pathLst>
+              <a:path w="120000" h="120000">
+                <a:moveTo>
+                  <a:pt x="0" y="0"/>
+                </a:moveTo>
+                <a:lnTo>
+                  <a:pt x="120000" y="0"/>
+                </a:lnTo>
+                <a:lnTo>
+                  <a:pt x="120000" y="120000"/>
+                </a:lnTo>
+                <a:lnTo>
+                  <a:pt x="0" y="120000"/>
+                </a:lnTo>
+                <a:lnTo>
+                  <a:pt x="0" y="0"/>
+                </a:lnTo>
+                <a:close/>
+              </a:path>
+            </a:pathLst>
+          </a:custGeom>
+        </p:spPr>
+        <p:txBody>
+          <a:bodyPr/>
+          <a:lstStyle/>
+          <a:p/>
+        </p:txBody>
+      </p:sp>
+      <p:sp>
+        <p:nvSpPr>
+          <p:cNvPr id="82" name="Google Shape;82;g20c4033f8d1_0_22:notes"/>
+          <p:cNvSpPr>
+            <a:spLocks noGrp="1" noEditPoints="1"/>
+          </p:cNvSpPr>
+          <p:nvPr>
+            <p:ph type="body" idx="1"/>
+          </p:nvPr>
+        </p:nvSpPr>
+        <p:spPr>
+          <a:xfrm>
+            <a:off x="685800" y="4343400"/>
+            <a:ext cx="5486400" cy="4114800"/>
+          </a:xfrm>
+          <a:prstGeom prst="rect">
+            <a:avLst/>
+          </a:prstGeom>
+        </p:spPr>
+        <p:txBody>
+          <a:bodyPr spcFirstLastPara="1" wrap="square" lIns="91425" tIns="91425" rIns="91425" bIns="91425" anchor="t">
+            <a:noAutofit/>
+          </a:bodyPr>
+          <a:lstStyle/>
+          <a:p>
+            <a:pPr marL="0" indent="0" algn="l" rtl="0">
+              <a:spcBef>
+                <a:spcPts val="0"/>
+              </a:spcBef>
+              <a:spcAft>
+                <a:spcPts val="0"/>
+              </a:spcAft>
+              <a:buNone/>
+            </a:pPr>
+          </a:p>
+        </p:txBody>
+      </p:sp>
+    </p:spTree>
+  </p:cSld>
+  <p:clrMapOvr>
+    <a:masterClrMapping/>
+  </p:clrMapOvr>
+</p:notes>
+</file>
+
+<file path=ppt/notesSlides/notesSlide18.xml><?xml version="1.0" encoding="utf-8"?>
+<p:notes xmlns:a="http://schemas.openxmlformats.org/drawingml/2006/main" xmlns:r="http://schemas.openxmlformats.org/officeDocument/2006/relationships" xmlns:p="http://schemas.openxmlformats.org/presentationml/2006/main" showMasterSp="0">
+  <p:cSld>
+    <p:spTree>
+      <p:nvGrpSpPr>
+        <p:cNvPr id="1" name=""/>
+        <p:cNvGrpSpPr/>
+        <p:nvPr/>
+      </p:nvGrpSpPr>
+      <p:grpSpPr>
+        <a:xfrm>
+          <a:off x="0" y="0"/>
+          <a:ext cx="0" cy="0"/>
+          <a:chOff x="0" y="0"/>
+          <a:chExt cx="0" cy="0"/>
+        </a:xfrm>
+      </p:grpSpPr>
+      <p:sp>
+        <p:nvSpPr>
           <p:cNvPr id="128" name="Google Shape;128;g2c2bf8da8be_0_110:notes"/>
           <p:cNvSpPr>
             <a:spLocks noGrp="1" noEditPoints="1"/>
@@ -2454,7 +2563,7 @@
       </p:grpSpPr>
       <p:sp>
         <p:nvSpPr>
-          <p:cNvPr id="98" name="Google Shape;98;g20c4033f8d1_0_34:notes"/>
+          <p:cNvPr id="81" name="Google Shape;81;g20c4033f8d1_0_22:notes"/>
           <p:cNvSpPr>
             <a:spLocks noGrp="1" noEditPoints="1"/>
           </p:cNvSpPr>
@@ -2500,7 +2609,7 @@
       </p:sp>
       <p:sp>
         <p:nvSpPr>
-          <p:cNvPr id="99" name="Google Shape;99;g20c4033f8d1_0_34:notes"/>
+          <p:cNvPr id="82" name="Google Shape;82;g20c4033f8d1_0_22:notes"/>
           <p:cNvSpPr>
             <a:spLocks noGrp="1" noEditPoints="1"/>
           </p:cNvSpPr>
@@ -7372,7 +7481,7 @@
       </p:grpSpPr>
       <p:sp>
         <p:nvSpPr>
-          <p:cNvPr id="84" name="Google Shape;84;p17"/>
+          <p:cNvPr id="101" name="Google Shape;101;p19"/>
           <p:cNvSpPr>
             <a:spLocks noGrp="1" noEditPoints="1"/>
           </p:cNvSpPr>
@@ -7408,24 +7517,18 @@
               <a:buNone/>
             </a:pPr>
             <a:r>
-              <a:rPr lang="en-US" sz="2000">
+              <a:rPr lang="fr-BE" sz="2000">
                 <a:latin typeface="Arial"/>
                 <a:ea typeface="Arial"/>
                 <a:cs typeface="Arial"/>
                 <a:sym typeface="Montserrat" pitchFamily="18" charset="0"/>
               </a:rPr>
-              <a:t>Les choix technologiques :</a:t>
+              <a:t>Les outils de développent</a:t>
             </a:r>
-            <a:r>
-              <a:rPr lang="fr" sz="2000">
-                <a:latin typeface="Arial"/>
-                <a:ea typeface="Arial"/>
-                <a:cs typeface="Arial"/>
-                <a:sym typeface="Montserrat" pitchFamily="18" charset="0"/>
-              </a:rPr>
-              <a:t> </a:t>
-            </a:r>
-            <a:endParaRPr sz="3000">
+            <a:endParaRPr lang="fr-BE" sz="1800">
+              <a:solidFill>
+                <a:schemeClr val="dk2"/>
+              </a:solidFill>
               <a:latin typeface="Arial"/>
               <a:ea typeface="Arial"/>
               <a:cs typeface="Arial"/>
@@ -7436,7 +7539,212 @@
       </p:sp>
       <p:sp>
         <p:nvSpPr>
-          <p:cNvPr id="86" name="Google Shape;86;p17"/>
+          <p:cNvPr id="102" name="Google Shape;102;p19"/>
+          <p:cNvSpPr>
+            <a:spLocks noGrp="1" noEditPoints="1"/>
+          </p:cNvSpPr>
+          <p:nvPr>
+            <p:ph type="body" idx="1"/>
+          </p:nvPr>
+        </p:nvSpPr>
+        <p:spPr>
+          <a:xfrm>
+            <a:off x="311700" y="1152475"/>
+            <a:ext cx="8520600" cy="3416400"/>
+          </a:xfrm>
+          <a:prstGeom prst="rect">
+            <a:avLst/>
+          </a:prstGeom>
+        </p:spPr>
+        <p:txBody>
+          <a:bodyPr spcFirstLastPara="1" wrap="square" lIns="91425" tIns="91425" rIns="91425" bIns="91425" anchor="t">
+            <a:normAutofit/>
+          </a:bodyPr>
+          <a:lstStyle/>
+          <a:p>
+            <a:pPr marL="0" indent="0" algn="l" rtl="0">
+              <a:spcBef>
+                <a:spcPts val="0"/>
+              </a:spcBef>
+              <a:spcAft>
+                <a:spcPts val="0"/>
+              </a:spcAft>
+              <a:buNone/>
+            </a:pPr>
+            <a:endParaRPr>
+              <a:latin typeface="Montserrat" pitchFamily="18" charset="0"/>
+              <a:ea typeface="Montserrat" pitchFamily="18" charset="0"/>
+              <a:cs typeface="Montserrat" pitchFamily="18" charset="0"/>
+              <a:sym typeface="Montserrat" pitchFamily="18" charset="0"/>
+            </a:endParaRPr>
+          </a:p>
+          <a:p>
+            <a:pPr marL="0" indent="0" algn="l" rtl="0">
+              <a:spcBef>
+                <a:spcPts val="1200"/>
+              </a:spcBef>
+              <a:spcAft>
+                <a:spcPts val="0"/>
+              </a:spcAft>
+              <a:buNone/>
+            </a:pPr>
+            <a:endParaRPr>
+              <a:latin typeface="Montserrat" pitchFamily="18" charset="0"/>
+              <a:ea typeface="Montserrat" pitchFamily="18" charset="0"/>
+              <a:cs typeface="Montserrat" pitchFamily="18" charset="0"/>
+              <a:sym typeface="Montserrat" pitchFamily="18" charset="0"/>
+            </a:endParaRPr>
+          </a:p>
+          <a:p>
+            <a:pPr marL="457200" indent="0" algn="l" rtl="0">
+              <a:spcBef>
+                <a:spcPts val="1200"/>
+              </a:spcBef>
+              <a:spcAft>
+                <a:spcPts val="1200"/>
+              </a:spcAft>
+              <a:buNone/>
+            </a:pPr>
+            <a:endParaRPr>
+              <a:latin typeface="Montserrat" pitchFamily="18" charset="0"/>
+              <a:ea typeface="Montserrat" pitchFamily="18" charset="0"/>
+              <a:cs typeface="Montserrat" pitchFamily="18" charset="0"/>
+              <a:sym typeface="Montserrat" pitchFamily="18" charset="0"/>
+            </a:endParaRPr>
+          </a:p>
+        </p:txBody>
+      </p:sp>
+      <p:sp>
+        <p:nvSpPr>
+          <p:cNvPr id="103" name="Google Shape;103;p19"/>
+          <p:cNvSpPr txBox="1"/>
+          <p:nvPr/>
+        </p:nvSpPr>
+        <p:spPr>
+          <a:xfrm>
+            <a:off x="0" y="0"/>
+            <a:ext cx="4911600" cy="356914"/>
+          </a:xfrm>
+          <a:prstGeom prst="rect">
+            <a:avLst/>
+          </a:prstGeom>
+          <a:noFill/>
+          <a:ln>
+            <a:noFill/>
+          </a:ln>
+        </p:spPr>
+        <p:txBody>
+          <a:bodyPr spcFirstLastPara="1" wrap="square" lIns="91425" tIns="91425" rIns="91425" bIns="91425" anchor="t">
+            <a:spAutoFit/>
+          </a:bodyPr>
+          <a:lstStyle/>
+          <a:p>
+            <a:pPr marL="0" indent="0" algn="l" rtl="0">
+              <a:lnSpc>
+                <a:spcPct val="115000"/>
+              </a:lnSpc>
+              <a:spcBef>
+                <a:spcPts val="0"/>
+              </a:spcBef>
+              <a:spcAft>
+                <a:spcPts val="1200"/>
+              </a:spcAft>
+              <a:buNone/>
+            </a:pPr>
+            <a:endParaRPr sz="1000"/>
+          </a:p>
+        </p:txBody>
+      </p:sp>
+      <p:sp>
+        <p:nvSpPr>
+          <p:cNvPr id="104" name="Google Shape;104;p19"/>
+          <p:cNvSpPr txBox="1"/>
+          <p:nvPr/>
+        </p:nvSpPr>
+        <p:spPr>
+          <a:xfrm>
+            <a:off x="434775" y="1085525"/>
+            <a:ext cx="8320500" cy="1099029"/>
+          </a:xfrm>
+          <a:prstGeom prst="rect">
+            <a:avLst/>
+          </a:prstGeom>
+          <a:noFill/>
+          <a:ln>
+            <a:noFill/>
+          </a:ln>
+        </p:spPr>
+        <p:txBody>
+          <a:bodyPr spcFirstLastPara="1" wrap="square" lIns="91425" tIns="91425" rIns="91425" bIns="91425" anchor="t">
+            <a:spAutoFit/>
+          </a:bodyPr>
+          <a:lstStyle/>
+          <a:p>
+            <a:pPr marL="133350" indent="0" algn="l" rtl="0">
+              <a:lnSpc>
+                <a:spcPct val="150000"/>
+              </a:lnSpc>
+              <a:spcBef>
+                <a:spcPts val="0"/>
+              </a:spcBef>
+              <a:spcAft>
+                <a:spcPts val="0"/>
+              </a:spcAft>
+              <a:buFont typeface="Montserrat" pitchFamily="18" charset="0"/>
+              <a:buNone/>
+            </a:pPr>
+            <a:endParaRPr sz="1500">
+              <a:solidFill>
+                <a:srgbClr val="0D0D0D"/>
+              </a:solidFill>
+              <a:highlight>
+                <a:srgbClr val="FFFFFF"/>
+              </a:highlight>
+              <a:latin typeface="Montserrat" pitchFamily="18" charset="0"/>
+              <a:ea typeface="Montserrat" pitchFamily="18" charset="0"/>
+              <a:cs typeface="Montserrat" pitchFamily="18" charset="0"/>
+              <a:sym typeface="Montserrat" pitchFamily="18" charset="0"/>
+            </a:endParaRPr>
+          </a:p>
+          <a:p>
+            <a:pPr marL="0" indent="0" algn="l" rtl="0">
+              <a:lnSpc>
+                <a:spcPct val="115000"/>
+              </a:lnSpc>
+              <a:spcBef>
+                <a:spcPts val="0"/>
+              </a:spcBef>
+              <a:spcAft>
+                <a:spcPts val="0"/>
+              </a:spcAft>
+              <a:buNone/>
+            </a:pPr>
+            <a:endParaRPr sz="1200" i="1">
+              <a:solidFill>
+                <a:schemeClr val="dk1"/>
+              </a:solidFill>
+              <a:latin typeface="Montserrat" pitchFamily="18" charset="0"/>
+              <a:ea typeface="Montserrat" pitchFamily="18" charset="0"/>
+              <a:cs typeface="Montserrat" pitchFamily="18" charset="0"/>
+              <a:sym typeface="Montserrat" pitchFamily="18" charset="0"/>
+            </a:endParaRPr>
+          </a:p>
+          <a:p>
+            <a:pPr marL="0" indent="0" algn="l" rtl="0">
+              <a:spcBef>
+                <a:spcPts val="1200"/>
+              </a:spcBef>
+              <a:spcAft>
+                <a:spcPts val="0"/>
+              </a:spcAft>
+              <a:buNone/>
+            </a:pPr>
+          </a:p>
+        </p:txBody>
+      </p:sp>
+      <p:sp>
+        <p:nvSpPr>
+          <p:cNvPr id="105" name="Google Shape;105;p19"/>
           <p:cNvSpPr/>
           <p:nvPr/>
         </p:nvSpPr>
@@ -7481,7 +7789,7 @@
       </p:sp>
       <p:pic>
         <p:nvPicPr>
-          <p:cNvPr id="87" name="Google Shape;87;p17"/>
+          <p:cNvPr id="106" name="Google Shape;106;p19"/>
           <p:cNvPicPr preferRelativeResize="0"/>
           <p:nvPr/>
         </p:nvPicPr>
@@ -7508,9 +7816,38 @@
           </a:ln>
         </p:spPr>
       </p:pic>
+      <p:sp>
+        <p:nvSpPr>
+          <p:cNvPr id="112" name="BoîteDeDialogue 111"/>
+          <p:cNvSpPr txBox="1"/>
+          <p:nvPr/>
+        </p:nvSpPr>
+        <p:spPr>
+          <a:xfrm>
+            <a:off x="434775" y="1017725"/>
+            <a:ext cx="7810188" cy="774248"/>
+          </a:xfrm>
+          <a:prstGeom prst="rect">
+            <a:avLst/>
+          </a:prstGeom>
+          <a:noFill/>
+        </p:spPr>
+        <p:txBody>
+          <a:bodyPr wrap="square" rtlCol="0">
+            <a:spAutoFit/>
+          </a:bodyPr>
+          <a:lstStyle/>
+          <a:p>
+            <a:r>
+              <a:rPr lang="en-US" sz="1500"/>
+              <a:t>Pour ce projet, nous ferons appel aux services d'un de Front-end ainsi que d'un de Back-end. Il est donc important de prendre en compte leur domaine de compétences et de mettre en place un environnement de travail facilitant les échanges entre eux.</a:t>
+            </a:r>
+          </a:p>
+        </p:txBody>
+      </p:sp>
       <p:pic>
         <p:nvPicPr>
-          <p:cNvPr id="88" name="Image 87"/>
+          <p:cNvPr id="114" name="Image 113"/>
           <p:cNvPicPr>
             <a:picLocks noChangeAspect="1"/>
           </p:cNvPicPr>
@@ -7525,8 +7862,8 @@
         </p:blipFill>
         <p:spPr>
           <a:xfrm>
-            <a:off x="960056" y="1337161"/>
-            <a:ext cx="1460860" cy="1487103"/>
+            <a:off x="5661269" y="2049663"/>
+            <a:ext cx="1025326" cy="1044174"/>
           </a:xfrm>
           <a:prstGeom prst="rect">
             <a:avLst/>
@@ -7535,7 +7872,7 @@
       </p:pic>
       <p:pic>
         <p:nvPicPr>
-          <p:cNvPr id="89" name="Image 88"/>
+          <p:cNvPr id="115" name="Image 114"/>
           <p:cNvPicPr>
             <a:picLocks noChangeAspect="1"/>
           </p:cNvPicPr>
@@ -7550,8 +7887,8 @@
         </p:blipFill>
         <p:spPr>
           <a:xfrm>
-            <a:off x="919308" y="2824264"/>
-            <a:ext cx="1542356" cy="621634"/>
+            <a:off x="5650550" y="3154176"/>
+            <a:ext cx="1046765" cy="373398"/>
           </a:xfrm>
           <a:prstGeom prst="rect">
             <a:avLst/>
@@ -7560,7 +7897,7 @@
       </p:pic>
       <p:pic>
         <p:nvPicPr>
-          <p:cNvPr id="90" name="Image 89"/>
+          <p:cNvPr id="116" name="Image 115"/>
           <p:cNvPicPr>
             <a:picLocks noChangeAspect="1"/>
           </p:cNvPicPr>
@@ -7575,8 +7912,8 @@
         </p:blipFill>
         <p:spPr>
           <a:xfrm>
-            <a:off x="3704980" y="1337161"/>
-            <a:ext cx="1444308" cy="1487103"/>
+            <a:off x="1112324" y="1989323"/>
+            <a:ext cx="1183872" cy="1164853"/>
           </a:xfrm>
           <a:prstGeom prst="rect">
             <a:avLst/>
@@ -7585,7 +7922,7 @@
       </p:pic>
       <p:pic>
         <p:nvPicPr>
-          <p:cNvPr id="91" name="Image 90"/>
+          <p:cNvPr id="117" name="Image 116"/>
           <p:cNvPicPr>
             <a:picLocks noChangeAspect="1"/>
           </p:cNvPicPr>
@@ -7600,33 +7937,8 @@
         </p:blipFill>
         <p:spPr>
           <a:xfrm>
-            <a:off x="3522847" y="2746740"/>
-            <a:ext cx="2098307" cy="548640"/>
-          </a:xfrm>
-          <a:prstGeom prst="rect">
-            <a:avLst/>
-          </a:prstGeom>
-        </p:spPr>
-      </p:pic>
-      <p:pic>
-        <p:nvPicPr>
-          <p:cNvPr id="92" name="Image 91"/>
-          <p:cNvPicPr>
-            <a:picLocks noChangeAspect="1"/>
-          </p:cNvPicPr>
-          <p:nvPr/>
-        </p:nvPicPr>
-        <p:blipFill>
-          <a:blip r:embed="rId6"/>
-          <a:srcRect/>
-          <a:stretch>
-            <a:fillRect/>
-          </a:stretch>
-        </p:blipFill>
-        <p:spPr>
-          <a:xfrm>
-            <a:off x="6103815" y="2069960"/>
-            <a:ext cx="2728484" cy="1003580"/>
+            <a:off x="1596211" y="3182033"/>
+            <a:ext cx="415313" cy="345541"/>
           </a:xfrm>
           <a:prstGeom prst="rect">
             <a:avLst/>
@@ -7635,14 +7947,14 @@
       </p:pic>
       <p:sp>
         <p:nvSpPr>
-          <p:cNvPr id="95" name="BoîteDeDialogue 94"/>
+          <p:cNvPr id="120" name="BoîteDeDialogue 119"/>
           <p:cNvSpPr txBox="1"/>
           <p:nvPr/>
         </p:nvSpPr>
         <p:spPr>
           <a:xfrm>
-            <a:off x="663071" y="3445898"/>
-            <a:ext cx="2054830" cy="1368807"/>
+            <a:off x="354561" y="3667377"/>
+            <a:ext cx="3406614" cy="545648"/>
           </a:xfrm>
           <a:prstGeom prst="rect">
             <a:avLst/>
@@ -7656,45 +7968,22 @@
           <a:lstStyle/>
           <a:p>
             <a:r>
-              <a:rPr lang="en-US"/>
-              <a:t>Pour la partie Frontend</a:t>
+              <a:rPr lang="en-US" sz="1500"/>
+              <a:t>Git est un outil de versionning permettant le contrôle des versions.</a:t>
             </a:r>
-          </a:p>
-          <a:p>
-            <a:r>
-              <a:rPr lang="en-US"/>
-              <a:t>avec ses nombreuses dépendances :</a:t>
-            </a:r>
-            <a:br>
-              <a:rPr lang="en-US"/>
-            </a:br>
-            <a:r>
-              <a:rPr lang="en-US"/>
-              <a:t>- react-pdf</a:t>
-            </a:r>
-            <a:br>
-              <a:rPr lang="en-US"/>
-            </a:br>
-            <a:r>
-              <a:rPr lang="en-US"/>
-              <a:t>- react-modal</a:t>
-            </a:r>
-            <a:br>
-              <a:rPr lang="en-US"/>
-            </a:br>
           </a:p>
         </p:txBody>
       </p:sp>
       <p:sp>
         <p:nvSpPr>
-          <p:cNvPr id="97" name="BoîteDeDialogue 96"/>
+          <p:cNvPr id="121" name="BoîteDeDialogue 120"/>
           <p:cNvSpPr txBox="1"/>
           <p:nvPr/>
         </p:nvSpPr>
         <p:spPr>
           <a:xfrm>
-            <a:off x="3522847" y="3416549"/>
-            <a:ext cx="2390163" cy="942087"/>
+            <a:off x="4221618" y="3667377"/>
+            <a:ext cx="3904627" cy="1231448"/>
           </a:xfrm>
           <a:prstGeom prst="rect">
             <a:avLst/>
@@ -7708,63 +7997,8 @@
           <a:lstStyle/>
           <a:p>
             <a:r>
-              <a:rPr lang="en-US"/>
-              <a:t>Pour la partie Base de données et son outils de visualisation simple :</a:t>
-            </a:r>
-          </a:p>
-          <a:p>
-            <a:r>
-              <a:rPr lang="en-US"/>
-              <a:t>- MongoDB compass</a:t>
-            </a:r>
-          </a:p>
-        </p:txBody>
-      </p:sp>
-      <p:sp>
-        <p:nvSpPr>
-          <p:cNvPr id="98" name="BoîteDeDialogue 97"/>
-          <p:cNvSpPr txBox="1"/>
-          <p:nvPr/>
-        </p:nvSpPr>
-        <p:spPr>
-          <a:xfrm>
-            <a:off x="6414745" y="3516157"/>
-            <a:ext cx="2054830" cy="1368807"/>
-          </a:xfrm>
-          <a:prstGeom prst="rect">
-            <a:avLst/>
-          </a:prstGeom>
-          <a:noFill/>
-        </p:spPr>
-        <p:txBody>
-          <a:bodyPr wrap="square" rtlCol="0">
-            <a:spAutoFit/>
-          </a:bodyPr>
-          <a:lstStyle/>
-          <a:p>
-            <a:r>
-              <a:rPr lang="en-US"/>
-              <a:t>Pour la partie Backend et ses nombreuses dépendances :</a:t>
-            </a:r>
-            <a:br>
-              <a:rPr lang="en-US"/>
-            </a:br>
-            <a:r>
-              <a:rPr lang="en-US"/>
-              <a:t>- Bcrypt</a:t>
-            </a:r>
-            <a:br>
-              <a:rPr lang="en-US"/>
-            </a:br>
-            <a:r>
-              <a:rPr lang="en-US"/>
-              <a:t>- Nodemon</a:t>
-            </a:r>
-          </a:p>
-          <a:p>
-            <a:r>
-              <a:rPr lang="en-US"/>
-              <a:t>- JsonWebtoken ...</a:t>
+              <a:rPr lang="en-US" sz="1500"/>
+              <a:t>GitHub est une plateforme d'hébergement et de partage de code source il permettra à nos développeurs de partager leur travail tous en pouvant se reposer sur la puissance du versionning de Git</a:t>
             </a:r>
           </a:p>
         </p:txBody>
@@ -7796,7 +8030,7 @@
       </p:grpSpPr>
       <p:sp>
         <p:nvSpPr>
-          <p:cNvPr id="101" name="Google Shape;101;p19"/>
+          <p:cNvPr id="84" name="Google Shape;84;p17"/>
           <p:cNvSpPr>
             <a:spLocks noGrp="1" noEditPoints="1"/>
           </p:cNvSpPr>
@@ -7838,12 +8072,18 @@
                 <a:cs typeface="Arial"/>
                 <a:sym typeface="Montserrat" pitchFamily="18" charset="0"/>
               </a:rPr>
-              <a:t>L'outils de gestion de projet :</a:t>
+              <a:t>Les choix technologiques :</a:t>
             </a:r>
-            <a:endParaRPr sz="1800">
-              <a:solidFill>
-                <a:schemeClr val="dk2"/>
-              </a:solidFill>
+            <a:r>
+              <a:rPr lang="fr" sz="2000">
+                <a:latin typeface="Arial"/>
+                <a:ea typeface="Arial"/>
+                <a:cs typeface="Arial"/>
+                <a:sym typeface="Montserrat" pitchFamily="18" charset="0"/>
+              </a:rPr>
+              <a:t> </a:t>
+            </a:r>
+            <a:endParaRPr sz="3000">
               <a:latin typeface="Arial"/>
               <a:ea typeface="Arial"/>
               <a:cs typeface="Arial"/>
@@ -7854,212 +8094,7 @@
       </p:sp>
       <p:sp>
         <p:nvSpPr>
-          <p:cNvPr id="102" name="Google Shape;102;p19"/>
-          <p:cNvSpPr>
-            <a:spLocks noGrp="1" noEditPoints="1"/>
-          </p:cNvSpPr>
-          <p:nvPr>
-            <p:ph type="body" idx="1"/>
-          </p:nvPr>
-        </p:nvSpPr>
-        <p:spPr>
-          <a:xfrm>
-            <a:off x="311700" y="1152475"/>
-            <a:ext cx="8520600" cy="3416400"/>
-          </a:xfrm>
-          <a:prstGeom prst="rect">
-            <a:avLst/>
-          </a:prstGeom>
-        </p:spPr>
-        <p:txBody>
-          <a:bodyPr spcFirstLastPara="1" wrap="square" lIns="91425" tIns="91425" rIns="91425" bIns="91425" anchor="t">
-            <a:normAutofit/>
-          </a:bodyPr>
-          <a:lstStyle/>
-          <a:p>
-            <a:pPr marL="0" indent="0" algn="l" rtl="0">
-              <a:spcBef>
-                <a:spcPts val="0"/>
-              </a:spcBef>
-              <a:spcAft>
-                <a:spcPts val="0"/>
-              </a:spcAft>
-              <a:buNone/>
-            </a:pPr>
-            <a:endParaRPr>
-              <a:latin typeface="Montserrat" pitchFamily="18" charset="0"/>
-              <a:ea typeface="Montserrat" pitchFamily="18" charset="0"/>
-              <a:cs typeface="Montserrat" pitchFamily="18" charset="0"/>
-              <a:sym typeface="Montserrat" pitchFamily="18" charset="0"/>
-            </a:endParaRPr>
-          </a:p>
-          <a:p>
-            <a:pPr marL="0" indent="0" algn="l" rtl="0">
-              <a:spcBef>
-                <a:spcPts val="1200"/>
-              </a:spcBef>
-              <a:spcAft>
-                <a:spcPts val="0"/>
-              </a:spcAft>
-              <a:buNone/>
-            </a:pPr>
-            <a:endParaRPr>
-              <a:latin typeface="Montserrat" pitchFamily="18" charset="0"/>
-              <a:ea typeface="Montserrat" pitchFamily="18" charset="0"/>
-              <a:cs typeface="Montserrat" pitchFamily="18" charset="0"/>
-              <a:sym typeface="Montserrat" pitchFamily="18" charset="0"/>
-            </a:endParaRPr>
-          </a:p>
-          <a:p>
-            <a:pPr marL="457200" indent="0" algn="l" rtl="0">
-              <a:spcBef>
-                <a:spcPts val="1200"/>
-              </a:spcBef>
-              <a:spcAft>
-                <a:spcPts val="1200"/>
-              </a:spcAft>
-              <a:buNone/>
-            </a:pPr>
-            <a:endParaRPr>
-              <a:latin typeface="Montserrat" pitchFamily="18" charset="0"/>
-              <a:ea typeface="Montserrat" pitchFamily="18" charset="0"/>
-              <a:cs typeface="Montserrat" pitchFamily="18" charset="0"/>
-              <a:sym typeface="Montserrat" pitchFamily="18" charset="0"/>
-            </a:endParaRPr>
-          </a:p>
-        </p:txBody>
-      </p:sp>
-      <p:sp>
-        <p:nvSpPr>
-          <p:cNvPr id="103" name="Google Shape;103;p19"/>
-          <p:cNvSpPr txBox="1"/>
-          <p:nvPr/>
-        </p:nvSpPr>
-        <p:spPr>
-          <a:xfrm>
-            <a:off x="0" y="0"/>
-            <a:ext cx="4911600" cy="356914"/>
-          </a:xfrm>
-          <a:prstGeom prst="rect">
-            <a:avLst/>
-          </a:prstGeom>
-          <a:noFill/>
-          <a:ln>
-            <a:noFill/>
-          </a:ln>
-        </p:spPr>
-        <p:txBody>
-          <a:bodyPr spcFirstLastPara="1" wrap="square" lIns="91425" tIns="91425" rIns="91425" bIns="91425" anchor="t">
-            <a:spAutoFit/>
-          </a:bodyPr>
-          <a:lstStyle/>
-          <a:p>
-            <a:pPr marL="0" indent="0" algn="l" rtl="0">
-              <a:lnSpc>
-                <a:spcPct val="115000"/>
-              </a:lnSpc>
-              <a:spcBef>
-                <a:spcPts val="0"/>
-              </a:spcBef>
-              <a:spcAft>
-                <a:spcPts val="1200"/>
-              </a:spcAft>
-              <a:buNone/>
-            </a:pPr>
-            <a:endParaRPr sz="1000"/>
-          </a:p>
-        </p:txBody>
-      </p:sp>
-      <p:sp>
-        <p:nvSpPr>
-          <p:cNvPr id="104" name="Google Shape;104;p19"/>
-          <p:cNvSpPr txBox="1"/>
-          <p:nvPr/>
-        </p:nvSpPr>
-        <p:spPr>
-          <a:xfrm>
-            <a:off x="434775" y="1085525"/>
-            <a:ext cx="8320500" cy="1099029"/>
-          </a:xfrm>
-          <a:prstGeom prst="rect">
-            <a:avLst/>
-          </a:prstGeom>
-          <a:noFill/>
-          <a:ln>
-            <a:noFill/>
-          </a:ln>
-        </p:spPr>
-        <p:txBody>
-          <a:bodyPr spcFirstLastPara="1" wrap="square" lIns="91425" tIns="91425" rIns="91425" bIns="91425" anchor="t">
-            <a:spAutoFit/>
-          </a:bodyPr>
-          <a:lstStyle/>
-          <a:p>
-            <a:pPr marL="133350" indent="0" algn="l" rtl="0">
-              <a:lnSpc>
-                <a:spcPct val="150000"/>
-              </a:lnSpc>
-              <a:spcBef>
-                <a:spcPts val="0"/>
-              </a:spcBef>
-              <a:spcAft>
-                <a:spcPts val="0"/>
-              </a:spcAft>
-              <a:buFont typeface="Montserrat" pitchFamily="18" charset="0"/>
-              <a:buNone/>
-            </a:pPr>
-            <a:endParaRPr sz="1500">
-              <a:solidFill>
-                <a:srgbClr val="0D0D0D"/>
-              </a:solidFill>
-              <a:highlight>
-                <a:srgbClr val="FFFFFF"/>
-              </a:highlight>
-              <a:latin typeface="Montserrat" pitchFamily="18" charset="0"/>
-              <a:ea typeface="Montserrat" pitchFamily="18" charset="0"/>
-              <a:cs typeface="Montserrat" pitchFamily="18" charset="0"/>
-              <a:sym typeface="Montserrat" pitchFamily="18" charset="0"/>
-            </a:endParaRPr>
-          </a:p>
-          <a:p>
-            <a:pPr marL="0" indent="0" algn="l" rtl="0">
-              <a:lnSpc>
-                <a:spcPct val="115000"/>
-              </a:lnSpc>
-              <a:spcBef>
-                <a:spcPts val="0"/>
-              </a:spcBef>
-              <a:spcAft>
-                <a:spcPts val="0"/>
-              </a:spcAft>
-              <a:buNone/>
-            </a:pPr>
-            <a:endParaRPr sz="1200" i="1">
-              <a:solidFill>
-                <a:schemeClr val="dk1"/>
-              </a:solidFill>
-              <a:latin typeface="Montserrat" pitchFamily="18" charset="0"/>
-              <a:ea typeface="Montserrat" pitchFamily="18" charset="0"/>
-              <a:cs typeface="Montserrat" pitchFamily="18" charset="0"/>
-              <a:sym typeface="Montserrat" pitchFamily="18" charset="0"/>
-            </a:endParaRPr>
-          </a:p>
-          <a:p>
-            <a:pPr marL="0" indent="0" algn="l" rtl="0">
-              <a:spcBef>
-                <a:spcPts val="1200"/>
-              </a:spcBef>
-              <a:spcAft>
-                <a:spcPts val="0"/>
-              </a:spcAft>
-              <a:buNone/>
-            </a:pPr>
-          </a:p>
-        </p:txBody>
-      </p:sp>
-      <p:sp>
-        <p:nvSpPr>
-          <p:cNvPr id="105" name="Google Shape;105;p19"/>
+          <p:cNvPr id="86" name="Google Shape;86;p17"/>
           <p:cNvSpPr/>
           <p:nvPr/>
         </p:nvSpPr>
@@ -8104,7 +8139,7 @@
       </p:sp>
       <p:pic>
         <p:nvPicPr>
-          <p:cNvPr id="106" name="Google Shape;106;p19"/>
+          <p:cNvPr id="87" name="Google Shape;87;p17"/>
           <p:cNvPicPr preferRelativeResize="0"/>
           <p:nvPr/>
         </p:nvPicPr>
@@ -8131,44 +8166,9 @@
           </a:ln>
         </p:spPr>
       </p:pic>
-      <p:sp>
-        <p:nvSpPr>
-          <p:cNvPr id="112" name="BoîteDeDialogue 111"/>
-          <p:cNvSpPr txBox="1"/>
-          <p:nvPr/>
-        </p:nvSpPr>
-        <p:spPr>
-          <a:xfrm>
-            <a:off x="311700" y="959270"/>
-            <a:ext cx="3605753" cy="1460048"/>
-          </a:xfrm>
-          <a:prstGeom prst="rect">
-            <a:avLst/>
-          </a:prstGeom>
-          <a:noFill/>
-        </p:spPr>
-        <p:txBody>
-          <a:bodyPr wrap="square" rtlCol="0">
-            <a:spAutoFit/>
-          </a:bodyPr>
-          <a:lstStyle/>
-          <a:p>
-            <a:r>
-              <a:rPr lang="en-US" sz="1500"/>
-              <a:t>Afin d'échanger et de collaborer avec l'ensemble de l'équipe dans les meilleures conditions, nous utiliserons Notion.</a:t>
-            </a:r>
-            <a:br>
-              <a:rPr lang="en-US" sz="1500"/>
-            </a:br>
-            <a:br>
-              <a:rPr lang="en-US" sz="1500"/>
-            </a:br>
-          </a:p>
-        </p:txBody>
-      </p:sp>
       <p:pic>
         <p:nvPicPr>
-          <p:cNvPr id="122" name="Image 121"/>
+          <p:cNvPr id="88" name="Image 87"/>
           <p:cNvPicPr>
             <a:picLocks noChangeAspect="1"/>
           </p:cNvPicPr>
@@ -8183,8 +8183,8 @@
         </p:blipFill>
         <p:spPr>
           <a:xfrm>
-            <a:off x="2455800" y="2571750"/>
-            <a:ext cx="6479496" cy="2287029"/>
+            <a:off x="960056" y="1337161"/>
+            <a:ext cx="1460860" cy="1487103"/>
           </a:xfrm>
           <a:prstGeom prst="rect">
             <a:avLst/>
@@ -8193,7 +8193,7 @@
       </p:pic>
       <p:pic>
         <p:nvPicPr>
-          <p:cNvPr id="123" name="Image 122"/>
+          <p:cNvPr id="89" name="Image 88"/>
           <p:cNvPicPr>
             <a:picLocks noChangeAspect="1"/>
           </p:cNvPicPr>
@@ -8208,8 +8208,83 @@
         </p:blipFill>
         <p:spPr>
           <a:xfrm>
-            <a:off x="3859817" y="239700"/>
-            <a:ext cx="4609758" cy="2636818"/>
+            <a:off x="919308" y="2824264"/>
+            <a:ext cx="1542356" cy="621634"/>
+          </a:xfrm>
+          <a:prstGeom prst="rect">
+            <a:avLst/>
+          </a:prstGeom>
+        </p:spPr>
+      </p:pic>
+      <p:pic>
+        <p:nvPicPr>
+          <p:cNvPr id="90" name="Image 89"/>
+          <p:cNvPicPr>
+            <a:picLocks noChangeAspect="1"/>
+          </p:cNvPicPr>
+          <p:nvPr/>
+        </p:nvPicPr>
+        <p:blipFill>
+          <a:blip r:embed="rId4"/>
+          <a:srcRect/>
+          <a:stretch>
+            <a:fillRect/>
+          </a:stretch>
+        </p:blipFill>
+        <p:spPr>
+          <a:xfrm>
+            <a:off x="3704980" y="1337161"/>
+            <a:ext cx="1444308" cy="1487103"/>
+          </a:xfrm>
+          <a:prstGeom prst="rect">
+            <a:avLst/>
+          </a:prstGeom>
+        </p:spPr>
+      </p:pic>
+      <p:pic>
+        <p:nvPicPr>
+          <p:cNvPr id="91" name="Image 90"/>
+          <p:cNvPicPr>
+            <a:picLocks noChangeAspect="1"/>
+          </p:cNvPicPr>
+          <p:nvPr/>
+        </p:nvPicPr>
+        <p:blipFill>
+          <a:blip r:embed="rId5"/>
+          <a:srcRect/>
+          <a:stretch>
+            <a:fillRect/>
+          </a:stretch>
+        </p:blipFill>
+        <p:spPr>
+          <a:xfrm>
+            <a:off x="3522847" y="2746740"/>
+            <a:ext cx="2098307" cy="548640"/>
+          </a:xfrm>
+          <a:prstGeom prst="rect">
+            <a:avLst/>
+          </a:prstGeom>
+        </p:spPr>
+      </p:pic>
+      <p:pic>
+        <p:nvPicPr>
+          <p:cNvPr id="92" name="Image 91"/>
+          <p:cNvPicPr>
+            <a:picLocks noChangeAspect="1"/>
+          </p:cNvPicPr>
+          <p:nvPr/>
+        </p:nvPicPr>
+        <p:blipFill>
+          <a:blip r:embed="rId6"/>
+          <a:srcRect/>
+          <a:stretch>
+            <a:fillRect/>
+          </a:stretch>
+        </p:blipFill>
+        <p:spPr>
+          <a:xfrm>
+            <a:off x="6103815" y="2069960"/>
+            <a:ext cx="2728484" cy="1003580"/>
           </a:xfrm>
           <a:prstGeom prst="rect">
             <a:avLst/>
@@ -8218,14 +8293,14 @@
       </p:pic>
       <p:sp>
         <p:nvSpPr>
-          <p:cNvPr id="124" name="BoîteDeDialogue 123"/>
+          <p:cNvPr id="95" name="BoîteDeDialogue 94"/>
           <p:cNvSpPr txBox="1"/>
           <p:nvPr/>
         </p:nvSpPr>
         <p:spPr>
           <a:xfrm>
-            <a:off x="311700" y="2870941"/>
-            <a:ext cx="2032000" cy="1688648"/>
+            <a:off x="663071" y="3445898"/>
+            <a:ext cx="2054830" cy="1368807"/>
           </a:xfrm>
           <a:prstGeom prst="rect">
             <a:avLst/>
@@ -8239,22 +8314,45 @@
           <a:lstStyle/>
           <a:p>
             <a:r>
-              <a:rPr lang="en-US" sz="1500"/>
-              <a:t>Notion est une plateforme de gestion de projets permettant l'organisation le partage et la collaboration au sein de l'équipe.</a:t>
+              <a:rPr lang="en-US"/>
+              <a:t>Pour la partie Frontend</a:t>
             </a:r>
+          </a:p>
+          <a:p>
+            <a:r>
+              <a:rPr lang="en-US"/>
+              <a:t>avec ses nombreuses dépendances :</a:t>
+            </a:r>
+            <a:br>
+              <a:rPr lang="en-US"/>
+            </a:br>
+            <a:r>
+              <a:rPr lang="en-US"/>
+              <a:t>- react-pdf</a:t>
+            </a:r>
+            <a:br>
+              <a:rPr lang="en-US"/>
+            </a:br>
+            <a:r>
+              <a:rPr lang="en-US"/>
+              <a:t>- react-modal</a:t>
+            </a:r>
+            <a:br>
+              <a:rPr lang="en-US"/>
+            </a:br>
           </a:p>
         </p:txBody>
       </p:sp>
       <p:sp>
         <p:nvSpPr>
-          <p:cNvPr id="125" name="BoîteDeDialogue 124"/>
+          <p:cNvPr id="97" name="BoîteDeDialogue 96"/>
           <p:cNvSpPr txBox="1"/>
           <p:nvPr/>
         </p:nvSpPr>
         <p:spPr>
           <a:xfrm>
-            <a:off x="599802" y="4858779"/>
-            <a:ext cx="8623596" cy="484887"/>
+            <a:off x="3522847" y="3416549"/>
+            <a:ext cx="2390163" cy="942087"/>
           </a:xfrm>
           <a:prstGeom prst="rect">
             <a:avLst/>
@@ -8268,12 +8366,64 @@
           <a:lstStyle/>
           <a:p>
             <a:r>
-              <a:rPr lang="en-US" sz="1200"/>
-              <a:t>https://www.notion.so/107db002f7b247b48b57f2ce828b4d5d?v=3280d11cd5524839a8df0a50a7bef41f&amp;pvs=4</a:t>
+              <a:rPr lang="en-US"/>
+              <a:t>Pour la partie Base de données et son outils de visualisation simple :</a:t>
             </a:r>
           </a:p>
           <a:p>
-            <a:endParaRPr lang="en-US"/>
+            <a:r>
+              <a:rPr lang="en-US"/>
+              <a:t>- MongoDB compass</a:t>
+            </a:r>
+          </a:p>
+        </p:txBody>
+      </p:sp>
+      <p:sp>
+        <p:nvSpPr>
+          <p:cNvPr id="98" name="BoîteDeDialogue 97"/>
+          <p:cNvSpPr txBox="1"/>
+          <p:nvPr/>
+        </p:nvSpPr>
+        <p:spPr>
+          <a:xfrm>
+            <a:off x="6414745" y="3516157"/>
+            <a:ext cx="2054830" cy="1368807"/>
+          </a:xfrm>
+          <a:prstGeom prst="rect">
+            <a:avLst/>
+          </a:prstGeom>
+          <a:noFill/>
+        </p:spPr>
+        <p:txBody>
+          <a:bodyPr wrap="square" rtlCol="0">
+            <a:spAutoFit/>
+          </a:bodyPr>
+          <a:lstStyle/>
+          <a:p>
+            <a:r>
+              <a:rPr lang="en-US"/>
+              <a:t>Pour la partie Backend et ses nombreuses dépendances :</a:t>
+            </a:r>
+            <a:br>
+              <a:rPr lang="en-US"/>
+            </a:br>
+            <a:r>
+              <a:rPr lang="en-US"/>
+              <a:t>- Bcrypt</a:t>
+            </a:r>
+            <a:br>
+              <a:rPr lang="en-US"/>
+            </a:br>
+            <a:r>
+              <a:rPr lang="en-US"/>
+              <a:t>- Nodemon</a:t>
+            </a:r>
+          </a:p>
+          <a:p>
+            <a:r>
+              <a:rPr lang="en-US"/>
+              <a:t>- JsonWebtoken ...</a:t>
+            </a:r>
           </a:p>
         </p:txBody>
       </p:sp>
@@ -8304,7 +8454,7 @@
       </p:grpSpPr>
       <p:sp>
         <p:nvSpPr>
-          <p:cNvPr id="111" name="Google Shape;111;p20"/>
+          <p:cNvPr id="101" name="Google Shape;101;p19"/>
           <p:cNvSpPr>
             <a:spLocks noGrp="1" noEditPoints="1"/>
           </p:cNvSpPr>
@@ -8314,7 +8464,7 @@
         </p:nvSpPr>
         <p:spPr>
           <a:xfrm>
-            <a:off x="311700" y="239700"/>
+            <a:off x="311700" y="445025"/>
             <a:ext cx="8520600" cy="572700"/>
           </a:xfrm>
           <a:prstGeom prst="rect">
@@ -8341,17 +8491,14 @@
             </a:pPr>
             <a:r>
               <a:rPr lang="en-US" sz="2000">
-                <a:solidFill>
-                  <a:schemeClr val="dk2"/>
-                </a:solidFill>
                 <a:latin typeface="Arial"/>
                 <a:ea typeface="Arial"/>
                 <a:cs typeface="Arial"/>
                 <a:sym typeface="Montserrat" pitchFamily="18" charset="0"/>
               </a:rPr>
-              <a:t>Outils de veille technologique :</a:t>
+              <a:t>L'outils de gestion de projet :</a:t>
             </a:r>
-            <a:endParaRPr sz="2000">
+            <a:endParaRPr sz="1800">
               <a:solidFill>
                 <a:schemeClr val="dk2"/>
               </a:solidFill>
@@ -8365,7 +8512,7 @@
       </p:sp>
       <p:sp>
         <p:nvSpPr>
-          <p:cNvPr id="112" name="Google Shape;112;p20"/>
+          <p:cNvPr id="102" name="Google Shape;102;p19"/>
           <p:cNvSpPr>
             <a:spLocks noGrp="1" noEditPoints="1"/>
           </p:cNvSpPr>
@@ -8375,7 +8522,7 @@
         </p:nvSpPr>
         <p:spPr>
           <a:xfrm>
-            <a:off x="316353" y="1018391"/>
+            <a:off x="311700" y="1152475"/>
             <a:ext cx="8520600" cy="3416400"/>
           </a:xfrm>
           <a:prstGeom prst="rect">
@@ -8442,7 +8589,7 @@
       </p:sp>
       <p:sp>
         <p:nvSpPr>
-          <p:cNvPr id="113" name="Google Shape;113;p20"/>
+          <p:cNvPr id="103" name="Google Shape;103;p19"/>
           <p:cNvSpPr txBox="1"/>
           <p:nvPr/>
         </p:nvSpPr>
@@ -8483,13 +8630,100 @@
       </p:sp>
       <p:sp>
         <p:nvSpPr>
-          <p:cNvPr id="115" name="Google Shape;115;p20"/>
+          <p:cNvPr id="104" name="Google Shape;104;p19"/>
+          <p:cNvSpPr txBox="1"/>
+          <p:nvPr/>
+        </p:nvSpPr>
+        <p:spPr>
+          <a:xfrm>
+            <a:off x="434775" y="1085525"/>
+            <a:ext cx="8320500" cy="1099029"/>
+          </a:xfrm>
+          <a:prstGeom prst="rect">
+            <a:avLst/>
+          </a:prstGeom>
+          <a:noFill/>
+          <a:ln>
+            <a:noFill/>
+          </a:ln>
+        </p:spPr>
+        <p:txBody>
+          <a:bodyPr spcFirstLastPara="1" wrap="square" lIns="91425" tIns="91425" rIns="91425" bIns="91425" anchor="t">
+            <a:spAutoFit/>
+          </a:bodyPr>
+          <a:lstStyle/>
+          <a:p>
+            <a:pPr marL="133350" indent="0" algn="l" rtl="0">
+              <a:lnSpc>
+                <a:spcPct val="150000"/>
+              </a:lnSpc>
+              <a:spcBef>
+                <a:spcPts val="0"/>
+              </a:spcBef>
+              <a:spcAft>
+                <a:spcPts val="0"/>
+              </a:spcAft>
+              <a:buFont typeface="Montserrat" pitchFamily="18" charset="0"/>
+              <a:buNone/>
+            </a:pPr>
+            <a:endParaRPr sz="1500">
+              <a:solidFill>
+                <a:srgbClr val="0D0D0D"/>
+              </a:solidFill>
+              <a:highlight>
+                <a:srgbClr val="FFFFFF"/>
+              </a:highlight>
+              <a:latin typeface="Montserrat" pitchFamily="18" charset="0"/>
+              <a:ea typeface="Montserrat" pitchFamily="18" charset="0"/>
+              <a:cs typeface="Montserrat" pitchFamily="18" charset="0"/>
+              <a:sym typeface="Montserrat" pitchFamily="18" charset="0"/>
+            </a:endParaRPr>
+          </a:p>
+          <a:p>
+            <a:pPr marL="0" indent="0" algn="l" rtl="0">
+              <a:lnSpc>
+                <a:spcPct val="115000"/>
+              </a:lnSpc>
+              <a:spcBef>
+                <a:spcPts val="0"/>
+              </a:spcBef>
+              <a:spcAft>
+                <a:spcPts val="0"/>
+              </a:spcAft>
+              <a:buNone/>
+            </a:pPr>
+            <a:endParaRPr sz="1200" i="1">
+              <a:solidFill>
+                <a:schemeClr val="dk1"/>
+              </a:solidFill>
+              <a:latin typeface="Montserrat" pitchFamily="18" charset="0"/>
+              <a:ea typeface="Montserrat" pitchFamily="18" charset="0"/>
+              <a:cs typeface="Montserrat" pitchFamily="18" charset="0"/>
+              <a:sym typeface="Montserrat" pitchFamily="18" charset="0"/>
+            </a:endParaRPr>
+          </a:p>
+          <a:p>
+            <a:pPr marL="0" indent="0" algn="l" rtl="0">
+              <a:spcBef>
+                <a:spcPts val="1200"/>
+              </a:spcBef>
+              <a:spcAft>
+                <a:spcPts val="0"/>
+              </a:spcAft>
+              <a:buNone/>
+            </a:pPr>
+          </a:p>
+        </p:txBody>
+      </p:sp>
+      <p:sp>
+        <p:nvSpPr>
+          <p:cNvPr id="105" name="Google Shape;105;p19"/>
           <p:cNvSpPr/>
           <p:nvPr/>
         </p:nvSpPr>
         <p:spPr>
           <a:xfrm>
-            <a:off x="-9600" y="0"/>
+            <a:off x="-4800" y="0"/>
             <a:ext cx="9153600" cy="239700"/>
           </a:xfrm>
           <a:prstGeom prst="rect">
@@ -8528,7 +8762,7 @@
       </p:sp>
       <p:pic>
         <p:nvPicPr>
-          <p:cNvPr id="116" name="Google Shape;116;p20"/>
+          <p:cNvPr id="106" name="Google Shape;106;p19"/>
           <p:cNvPicPr preferRelativeResize="0"/>
           <p:nvPr/>
         </p:nvPicPr>
@@ -8555,9 +8789,44 @@
           </a:ln>
         </p:spPr>
       </p:pic>
+      <p:sp>
+        <p:nvSpPr>
+          <p:cNvPr id="112" name="BoîteDeDialogue 111"/>
+          <p:cNvSpPr txBox="1"/>
+          <p:nvPr/>
+        </p:nvSpPr>
+        <p:spPr>
+          <a:xfrm>
+            <a:off x="311700" y="959270"/>
+            <a:ext cx="3605753" cy="1460048"/>
+          </a:xfrm>
+          <a:prstGeom prst="rect">
+            <a:avLst/>
+          </a:prstGeom>
+          <a:noFill/>
+        </p:spPr>
+        <p:txBody>
+          <a:bodyPr wrap="square" rtlCol="0">
+            <a:spAutoFit/>
+          </a:bodyPr>
+          <a:lstStyle/>
+          <a:p>
+            <a:r>
+              <a:rPr lang="en-US" sz="1500"/>
+              <a:t>Afin d'échanger et de collaborer avec l'ensemble de l'équipe dans les meilleures conditions, nous utiliserons Notion.</a:t>
+            </a:r>
+            <a:br>
+              <a:rPr lang="en-US" sz="1500"/>
+            </a:br>
+            <a:br>
+              <a:rPr lang="en-US" sz="1500"/>
+            </a:br>
+          </a:p>
+        </p:txBody>
+      </p:sp>
       <p:pic>
         <p:nvPicPr>
-          <p:cNvPr id="117" name="Image 116"/>
+          <p:cNvPr id="122" name="Image 121"/>
           <p:cNvPicPr>
             <a:picLocks noChangeAspect="1"/>
           </p:cNvPicPr>
@@ -8572,43 +8841,14 @@
         </p:blipFill>
         <p:spPr>
           <a:xfrm>
-            <a:off x="316353" y="678316"/>
-            <a:ext cx="8495088" cy="1290288"/>
+            <a:off x="2455800" y="2571750"/>
+            <a:ext cx="6479496" cy="2287029"/>
           </a:xfrm>
           <a:prstGeom prst="rect">
             <a:avLst/>
           </a:prstGeom>
         </p:spPr>
       </p:pic>
-      <p:sp>
-        <p:nvSpPr>
-          <p:cNvPr id="122" name="BoîteDeDialogue 121"/>
-          <p:cNvSpPr txBox="1"/>
-          <p:nvPr/>
-        </p:nvSpPr>
-        <p:spPr>
-          <a:xfrm>
-            <a:off x="311700" y="3690937"/>
-            <a:ext cx="8495087" cy="774248"/>
-          </a:xfrm>
-          <a:prstGeom prst="rect">
-            <a:avLst/>
-          </a:prstGeom>
-          <a:noFill/>
-        </p:spPr>
-        <p:txBody>
-          <a:bodyPr wrap="square" rtlCol="0">
-            <a:spAutoFit/>
-          </a:bodyPr>
-          <a:lstStyle/>
-          <a:p>
-            <a:r>
-              <a:rPr lang="en-US" sz="1500"/>
-              <a:t>Afin de renforcer la collaboration mais aussi de rester informe de l'évolution des technologies un outil de veille est mis en place grace à WAKELET qui est une plateforme de curation permettant le partage de ressources. Les principales ressources proviennent de googler, Youtube, twitter etc etc </a:t>
-            </a:r>
-          </a:p>
-        </p:txBody>
-      </p:sp>
       <p:pic>
         <p:nvPicPr>
           <p:cNvPr id="123" name="Image 122"/>
@@ -8626,133 +8866,8 @@
         </p:blipFill>
         <p:spPr>
           <a:xfrm>
-            <a:off x="1832088" y="678316"/>
-            <a:ext cx="1256732" cy="3012621"/>
-          </a:xfrm>
-          <a:prstGeom prst="rect">
-            <a:avLst/>
-          </a:prstGeom>
-        </p:spPr>
-      </p:pic>
-      <p:pic>
-        <p:nvPicPr>
-          <p:cNvPr id="124" name="Image 123"/>
-          <p:cNvPicPr>
-            <a:picLocks noChangeAspect="1"/>
-          </p:cNvPicPr>
-          <p:nvPr/>
-        </p:nvPicPr>
-        <p:blipFill>
-          <a:blip r:embed="rId4"/>
-          <a:srcRect/>
-          <a:stretch>
-            <a:fillRect/>
-          </a:stretch>
-        </p:blipFill>
-        <p:spPr>
-          <a:xfrm>
-            <a:off x="6067839" y="678316"/>
-            <a:ext cx="1194234" cy="3012621"/>
-          </a:xfrm>
-          <a:prstGeom prst="rect">
-            <a:avLst/>
-          </a:prstGeom>
-        </p:spPr>
-      </p:pic>
-      <p:pic>
-        <p:nvPicPr>
-          <p:cNvPr id="125" name="Image 124"/>
-          <p:cNvPicPr>
-            <a:picLocks noChangeAspect="1"/>
-          </p:cNvPicPr>
-          <p:nvPr/>
-        </p:nvPicPr>
-        <p:blipFill>
-          <a:blip r:embed="rId5"/>
-          <a:srcRect/>
-          <a:stretch>
-            <a:fillRect/>
-          </a:stretch>
-        </p:blipFill>
-        <p:spPr>
-          <a:xfrm>
-            <a:off x="925726" y="1968604"/>
-            <a:ext cx="906362" cy="1722333"/>
-          </a:xfrm>
-          <a:prstGeom prst="rect">
-            <a:avLst/>
-          </a:prstGeom>
-        </p:spPr>
-      </p:pic>
-      <p:pic>
-        <p:nvPicPr>
-          <p:cNvPr id="126" name="Image 125"/>
-          <p:cNvPicPr>
-            <a:picLocks noChangeAspect="1"/>
-          </p:cNvPicPr>
-          <p:nvPr/>
-        </p:nvPicPr>
-        <p:blipFill>
-          <a:blip r:embed="rId6"/>
-          <a:srcRect/>
-          <a:stretch>
-            <a:fillRect/>
-          </a:stretch>
-        </p:blipFill>
-        <p:spPr>
-          <a:xfrm>
-            <a:off x="3088820" y="1968604"/>
-            <a:ext cx="888636" cy="1722333"/>
-          </a:xfrm>
-          <a:prstGeom prst="rect">
-            <a:avLst/>
-          </a:prstGeom>
-        </p:spPr>
-      </p:pic>
-      <p:pic>
-        <p:nvPicPr>
-          <p:cNvPr id="127" name="Image 126"/>
-          <p:cNvPicPr>
-            <a:picLocks noChangeAspect="1"/>
-          </p:cNvPicPr>
-          <p:nvPr/>
-        </p:nvPicPr>
-        <p:blipFill>
-          <a:blip r:embed="rId7"/>
-          <a:srcRect/>
-          <a:stretch>
-            <a:fillRect/>
-          </a:stretch>
-        </p:blipFill>
-        <p:spPr>
-          <a:xfrm>
-            <a:off x="4576653" y="1968604"/>
-            <a:ext cx="1491187" cy="1722333"/>
-          </a:xfrm>
-          <a:prstGeom prst="rect">
-            <a:avLst/>
-          </a:prstGeom>
-        </p:spPr>
-      </p:pic>
-      <p:pic>
-        <p:nvPicPr>
-          <p:cNvPr id="128" name="Image 127"/>
-          <p:cNvPicPr>
-            <a:picLocks noChangeAspect="1"/>
-          </p:cNvPicPr>
-          <p:nvPr/>
-        </p:nvPicPr>
-        <p:blipFill>
-          <a:blip r:embed="rId8"/>
-          <a:srcRect/>
-          <a:stretch>
-            <a:fillRect/>
-          </a:stretch>
-        </p:blipFill>
-        <p:spPr>
-          <a:xfrm flipH="1">
-            <a:off x="7262073" y="1968604"/>
-            <a:ext cx="1480360" cy="1722333"/>
+            <a:off x="3859817" y="239700"/>
+            <a:ext cx="4609758" cy="2636818"/>
           </a:xfrm>
           <a:prstGeom prst="rect">
             <a:avLst/>
@@ -8761,14 +8876,14 @@
       </p:pic>
       <p:sp>
         <p:nvSpPr>
-          <p:cNvPr id="129" name="BoîteDeDialogue 128"/>
+          <p:cNvPr id="124" name="BoîteDeDialogue 123"/>
           <p:cNvSpPr txBox="1"/>
           <p:nvPr/>
         </p:nvSpPr>
         <p:spPr>
           <a:xfrm>
-            <a:off x="671660" y="4560217"/>
-            <a:ext cx="7877273" cy="317048"/>
+            <a:off x="311700" y="2870941"/>
+            <a:ext cx="2032000" cy="1688648"/>
           </a:xfrm>
           <a:prstGeom prst="rect">
             <a:avLst/>
@@ -8783,8 +8898,39 @@
           <a:p>
             <a:r>
               <a:rPr lang="en-US" sz="1500"/>
-              <a:t>Wakelet : https://wakelet.com/wake/T-jRNu5XQny6kX0IzfEOf</a:t>
+              <a:t>Notion est une plateforme de gestion de projets permettant l'organisation le partage et la collaboration au sein de l'équipe.</a:t>
             </a:r>
+          </a:p>
+        </p:txBody>
+      </p:sp>
+      <p:sp>
+        <p:nvSpPr>
+          <p:cNvPr id="125" name="BoîteDeDialogue 124"/>
+          <p:cNvSpPr txBox="1"/>
+          <p:nvPr/>
+        </p:nvSpPr>
+        <p:spPr>
+          <a:xfrm>
+            <a:off x="599802" y="4858779"/>
+            <a:ext cx="8623596" cy="484887"/>
+          </a:xfrm>
+          <a:prstGeom prst="rect">
+            <a:avLst/>
+          </a:prstGeom>
+          <a:noFill/>
+        </p:spPr>
+        <p:txBody>
+          <a:bodyPr wrap="square" rtlCol="0">
+            <a:spAutoFit/>
+          </a:bodyPr>
+          <a:lstStyle/>
+          <a:p>
+            <a:r>
+              <a:rPr lang="en-US" sz="1200"/>
+              <a:t>https://www.notion.so/107db002f7b247b48b57f2ce828b4d5d?v=3280d11cd5524839a8df0a50a7bef41f&amp;pvs=4</a:t>
+            </a:r>
+          </a:p>
+          <a:p>
             <a:endParaRPr lang="en-US"/>
           </a:p>
         </p:txBody>
@@ -8816,7 +8962,7 @@
       </p:grpSpPr>
       <p:sp>
         <p:nvSpPr>
-          <p:cNvPr id="84" name="Google Shape;84;p17"/>
+          <p:cNvPr id="111" name="Google Shape;111;p20"/>
           <p:cNvSpPr>
             <a:spLocks noGrp="1" noEditPoints="1"/>
           </p:cNvSpPr>
@@ -8826,7 +8972,7 @@
         </p:nvSpPr>
         <p:spPr>
           <a:xfrm>
-            <a:off x="311700" y="445025"/>
+            <a:off x="311700" y="239700"/>
             <a:ext cx="8520600" cy="572700"/>
           </a:xfrm>
           <a:prstGeom prst="rect">
@@ -8853,32 +8999,20 @@
             </a:pPr>
             <a:r>
               <a:rPr lang="en-US" sz="2000">
+                <a:solidFill>
+                  <a:schemeClr val="dk2"/>
+                </a:solidFill>
                 <a:latin typeface="Arial"/>
                 <a:ea typeface="Arial"/>
                 <a:cs typeface="Arial"/>
                 <a:sym typeface="Montserrat" pitchFamily="18" charset="0"/>
               </a:rPr>
-              <a:t>API Instagram</a:t>
+              <a:t>Outils de veille technologique :</a:t>
             </a:r>
-            <a:r>
-              <a:rPr lang="fr" sz="2000">
-                <a:latin typeface="Arial"/>
-                <a:ea typeface="Arial"/>
-                <a:cs typeface="Arial"/>
-                <a:sym typeface="Montserrat" pitchFamily="18" charset="0"/>
-              </a:rPr>
-              <a:t> </a:t>
-            </a:r>
-            <a:r>
-              <a:rPr lang="en-US" sz="2000">
-                <a:latin typeface="Arial"/>
-                <a:ea typeface="Arial"/>
-                <a:cs typeface="Arial"/>
-                <a:sym typeface="Montserrat" pitchFamily="18" charset="0"/>
-              </a:rPr>
-              <a:t>:</a:t>
-            </a:r>
-            <a:endParaRPr sz="3000">
+            <a:endParaRPr sz="2000">
+              <a:solidFill>
+                <a:schemeClr val="dk2"/>
+              </a:solidFill>
               <a:latin typeface="Arial"/>
               <a:ea typeface="Arial"/>
               <a:cs typeface="Arial"/>
@@ -8889,13 +9023,131 @@
       </p:sp>
       <p:sp>
         <p:nvSpPr>
-          <p:cNvPr id="86" name="Google Shape;86;p17"/>
+          <p:cNvPr id="112" name="Google Shape;112;p20"/>
+          <p:cNvSpPr>
+            <a:spLocks noGrp="1" noEditPoints="1"/>
+          </p:cNvSpPr>
+          <p:nvPr>
+            <p:ph type="body" idx="1"/>
+          </p:nvPr>
+        </p:nvSpPr>
+        <p:spPr>
+          <a:xfrm>
+            <a:off x="316353" y="1018391"/>
+            <a:ext cx="8520600" cy="3416400"/>
+          </a:xfrm>
+          <a:prstGeom prst="rect">
+            <a:avLst/>
+          </a:prstGeom>
+        </p:spPr>
+        <p:txBody>
+          <a:bodyPr spcFirstLastPara="1" wrap="square" lIns="91425" tIns="91425" rIns="91425" bIns="91425" anchor="t">
+            <a:normAutofit/>
+          </a:bodyPr>
+          <a:lstStyle/>
+          <a:p>
+            <a:pPr marL="0" indent="0" algn="l" rtl="0">
+              <a:spcBef>
+                <a:spcPts val="0"/>
+              </a:spcBef>
+              <a:spcAft>
+                <a:spcPts val="0"/>
+              </a:spcAft>
+              <a:buNone/>
+            </a:pPr>
+            <a:endParaRPr>
+              <a:latin typeface="Montserrat" pitchFamily="18" charset="0"/>
+              <a:ea typeface="Montserrat" pitchFamily="18" charset="0"/>
+              <a:cs typeface="Montserrat" pitchFamily="18" charset="0"/>
+              <a:sym typeface="Montserrat" pitchFamily="18" charset="0"/>
+            </a:endParaRPr>
+          </a:p>
+          <a:p>
+            <a:pPr marL="0" indent="0" algn="l" rtl="0">
+              <a:spcBef>
+                <a:spcPts val="1200"/>
+              </a:spcBef>
+              <a:spcAft>
+                <a:spcPts val="0"/>
+              </a:spcAft>
+              <a:buNone/>
+            </a:pPr>
+            <a:endParaRPr>
+              <a:latin typeface="Montserrat" pitchFamily="18" charset="0"/>
+              <a:ea typeface="Montserrat" pitchFamily="18" charset="0"/>
+              <a:cs typeface="Montserrat" pitchFamily="18" charset="0"/>
+              <a:sym typeface="Montserrat" pitchFamily="18" charset="0"/>
+            </a:endParaRPr>
+          </a:p>
+          <a:p>
+            <a:pPr marL="457200" indent="0" algn="l" rtl="0">
+              <a:spcBef>
+                <a:spcPts val="1200"/>
+              </a:spcBef>
+              <a:spcAft>
+                <a:spcPts val="1200"/>
+              </a:spcAft>
+              <a:buNone/>
+            </a:pPr>
+            <a:endParaRPr>
+              <a:latin typeface="Montserrat" pitchFamily="18" charset="0"/>
+              <a:ea typeface="Montserrat" pitchFamily="18" charset="0"/>
+              <a:cs typeface="Montserrat" pitchFamily="18" charset="0"/>
+              <a:sym typeface="Montserrat" pitchFamily="18" charset="0"/>
+            </a:endParaRPr>
+          </a:p>
+        </p:txBody>
+      </p:sp>
+      <p:sp>
+        <p:nvSpPr>
+          <p:cNvPr id="113" name="Google Shape;113;p20"/>
+          <p:cNvSpPr txBox="1"/>
+          <p:nvPr/>
+        </p:nvSpPr>
+        <p:spPr>
+          <a:xfrm>
+            <a:off x="0" y="0"/>
+            <a:ext cx="4911600" cy="356914"/>
+          </a:xfrm>
+          <a:prstGeom prst="rect">
+            <a:avLst/>
+          </a:prstGeom>
+          <a:noFill/>
+          <a:ln>
+            <a:noFill/>
+          </a:ln>
+        </p:spPr>
+        <p:txBody>
+          <a:bodyPr spcFirstLastPara="1" wrap="square" lIns="91425" tIns="91425" rIns="91425" bIns="91425" anchor="t">
+            <a:spAutoFit/>
+          </a:bodyPr>
+          <a:lstStyle/>
+          <a:p>
+            <a:pPr marL="0" indent="0" algn="l" rtl="0">
+              <a:lnSpc>
+                <a:spcPct val="115000"/>
+              </a:lnSpc>
+              <a:spcBef>
+                <a:spcPts val="0"/>
+              </a:spcBef>
+              <a:spcAft>
+                <a:spcPts val="1200"/>
+              </a:spcAft>
+              <a:buNone/>
+            </a:pPr>
+            <a:endParaRPr sz="1000"/>
+          </a:p>
+        </p:txBody>
+      </p:sp>
+      <p:sp>
+        <p:nvSpPr>
+          <p:cNvPr id="115" name="Google Shape;115;p20"/>
           <p:cNvSpPr/>
           <p:nvPr/>
         </p:nvSpPr>
         <p:spPr>
           <a:xfrm>
-            <a:off x="-4800" y="0"/>
+            <a:off x="-9600" y="0"/>
             <a:ext cx="9153600" cy="239700"/>
           </a:xfrm>
           <a:prstGeom prst="rect">
@@ -8934,7 +9186,7 @@
       </p:sp>
       <p:pic>
         <p:nvPicPr>
-          <p:cNvPr id="87" name="Google Shape;87;p17"/>
+          <p:cNvPr id="116" name="Google Shape;116;p20"/>
           <p:cNvPicPr preferRelativeResize="0"/>
           <p:nvPr/>
         </p:nvPicPr>
@@ -8961,62 +9213,9 @@
           </a:ln>
         </p:spPr>
       </p:pic>
-      <p:sp>
-        <p:nvSpPr>
-          <p:cNvPr id="95" name="BoîteDeDialogue 94"/>
-          <p:cNvSpPr txBox="1"/>
-          <p:nvPr/>
-        </p:nvSpPr>
-        <p:spPr>
-          <a:xfrm>
-            <a:off x="348627" y="946275"/>
-            <a:ext cx="8458161" cy="1460048"/>
-          </a:xfrm>
-          <a:prstGeom prst="rect">
-            <a:avLst/>
-          </a:prstGeom>
-          <a:noFill/>
-        </p:spPr>
-        <p:txBody>
-          <a:bodyPr wrap="square" rtlCol="0">
-            <a:spAutoFit/>
-          </a:bodyPr>
-          <a:lstStyle/>
-          <a:p>
-            <a:r>
-              <a:rPr lang="en-US" sz="1500"/>
-              <a:t>Afin de maximiser l'attrait de menu-maker nous utiliserons l'API Graph d'Instagram qui permettra pour les comptes business et Creator :</a:t>
-            </a:r>
-          </a:p>
-          <a:p>
-            <a:r>
-              <a:rPr lang="en-US" sz="1500"/>
-              <a:t>- de publier et de récupérer du contenu </a:t>
-            </a:r>
-          </a:p>
-          <a:p>
-            <a:r>
-              <a:rPr lang="en-US" sz="1500"/>
-              <a:t>- de Modérer les commentaires "Réponse/suppression"? </a:t>
-            </a:r>
-          </a:p>
-          <a:p>
-            <a:r>
-              <a:rPr lang="en-US" sz="1500"/>
-              <a:t>- d'être identifié mentionné avec les #</a:t>
-            </a:r>
-          </a:p>
-          <a:p>
-            <a:r>
-              <a:rPr lang="en-US" sz="1500"/>
-              <a:t>- Obtenir des informations sur les concurrents sous forme de métadonnées.</a:t>
-            </a:r>
-          </a:p>
-        </p:txBody>
-      </p:sp>
       <p:pic>
         <p:nvPicPr>
-          <p:cNvPr id="97" name="Image 96"/>
+          <p:cNvPr id="117" name="Image 116"/>
           <p:cNvPicPr>
             <a:picLocks noChangeAspect="1"/>
           </p:cNvPicPr>
@@ -9031,17 +9230,46 @@
         </p:blipFill>
         <p:spPr>
           <a:xfrm>
-            <a:off x="412194" y="2406323"/>
-            <a:ext cx="2809962" cy="2551244"/>
+            <a:off x="316353" y="678316"/>
+            <a:ext cx="8495088" cy="1290288"/>
           </a:xfrm>
           <a:prstGeom prst="rect">
             <a:avLst/>
           </a:prstGeom>
         </p:spPr>
       </p:pic>
+      <p:sp>
+        <p:nvSpPr>
+          <p:cNvPr id="122" name="BoîteDeDialogue 121"/>
+          <p:cNvSpPr txBox="1"/>
+          <p:nvPr/>
+        </p:nvSpPr>
+        <p:spPr>
+          <a:xfrm>
+            <a:off x="311700" y="3690937"/>
+            <a:ext cx="8495087" cy="774248"/>
+          </a:xfrm>
+          <a:prstGeom prst="rect">
+            <a:avLst/>
+          </a:prstGeom>
+          <a:noFill/>
+        </p:spPr>
+        <p:txBody>
+          <a:bodyPr wrap="square" rtlCol="0">
+            <a:spAutoFit/>
+          </a:bodyPr>
+          <a:lstStyle/>
+          <a:p>
+            <a:r>
+              <a:rPr lang="en-US" sz="1500"/>
+              <a:t>Afin de renforcer la collaboration mais aussi de rester informe de l'évolution des technologies un outil de veille est mis en place grace à WAKELET qui est une plateforme de curation permettant le partage de ressources. Les principales ressources proviennent de googler, Youtube, twitter etc etc </a:t>
+            </a:r>
+          </a:p>
+        </p:txBody>
+      </p:sp>
       <p:pic>
         <p:nvPicPr>
-          <p:cNvPr id="98" name="Image 97"/>
+          <p:cNvPr id="123" name="Image 122"/>
           <p:cNvPicPr>
             <a:picLocks noChangeAspect="1"/>
           </p:cNvPicPr>
@@ -9056,14 +9284,169 @@
         </p:blipFill>
         <p:spPr>
           <a:xfrm>
-            <a:off x="3364502" y="2876603"/>
-            <a:ext cx="4930105" cy="1519443"/>
+            <a:off x="1832088" y="678316"/>
+            <a:ext cx="1256732" cy="3012621"/>
           </a:xfrm>
           <a:prstGeom prst="rect">
             <a:avLst/>
           </a:prstGeom>
         </p:spPr>
       </p:pic>
+      <p:pic>
+        <p:nvPicPr>
+          <p:cNvPr id="124" name="Image 123"/>
+          <p:cNvPicPr>
+            <a:picLocks noChangeAspect="1"/>
+          </p:cNvPicPr>
+          <p:nvPr/>
+        </p:nvPicPr>
+        <p:blipFill>
+          <a:blip r:embed="rId4"/>
+          <a:srcRect/>
+          <a:stretch>
+            <a:fillRect/>
+          </a:stretch>
+        </p:blipFill>
+        <p:spPr>
+          <a:xfrm>
+            <a:off x="6067839" y="678316"/>
+            <a:ext cx="1194234" cy="3012621"/>
+          </a:xfrm>
+          <a:prstGeom prst="rect">
+            <a:avLst/>
+          </a:prstGeom>
+        </p:spPr>
+      </p:pic>
+      <p:pic>
+        <p:nvPicPr>
+          <p:cNvPr id="125" name="Image 124"/>
+          <p:cNvPicPr>
+            <a:picLocks noChangeAspect="1"/>
+          </p:cNvPicPr>
+          <p:nvPr/>
+        </p:nvPicPr>
+        <p:blipFill>
+          <a:blip r:embed="rId5"/>
+          <a:srcRect/>
+          <a:stretch>
+            <a:fillRect/>
+          </a:stretch>
+        </p:blipFill>
+        <p:spPr>
+          <a:xfrm>
+            <a:off x="925726" y="1968604"/>
+            <a:ext cx="906362" cy="1722333"/>
+          </a:xfrm>
+          <a:prstGeom prst="rect">
+            <a:avLst/>
+          </a:prstGeom>
+        </p:spPr>
+      </p:pic>
+      <p:pic>
+        <p:nvPicPr>
+          <p:cNvPr id="126" name="Image 125"/>
+          <p:cNvPicPr>
+            <a:picLocks noChangeAspect="1"/>
+          </p:cNvPicPr>
+          <p:nvPr/>
+        </p:nvPicPr>
+        <p:blipFill>
+          <a:blip r:embed="rId6"/>
+          <a:srcRect/>
+          <a:stretch>
+            <a:fillRect/>
+          </a:stretch>
+        </p:blipFill>
+        <p:spPr>
+          <a:xfrm>
+            <a:off x="3088820" y="1968604"/>
+            <a:ext cx="888636" cy="1722333"/>
+          </a:xfrm>
+          <a:prstGeom prst="rect">
+            <a:avLst/>
+          </a:prstGeom>
+        </p:spPr>
+      </p:pic>
+      <p:pic>
+        <p:nvPicPr>
+          <p:cNvPr id="127" name="Image 126"/>
+          <p:cNvPicPr>
+            <a:picLocks noChangeAspect="1"/>
+          </p:cNvPicPr>
+          <p:nvPr/>
+        </p:nvPicPr>
+        <p:blipFill>
+          <a:blip r:embed="rId7"/>
+          <a:srcRect/>
+          <a:stretch>
+            <a:fillRect/>
+          </a:stretch>
+        </p:blipFill>
+        <p:spPr>
+          <a:xfrm>
+            <a:off x="4576653" y="1968604"/>
+            <a:ext cx="1491187" cy="1722333"/>
+          </a:xfrm>
+          <a:prstGeom prst="rect">
+            <a:avLst/>
+          </a:prstGeom>
+        </p:spPr>
+      </p:pic>
+      <p:pic>
+        <p:nvPicPr>
+          <p:cNvPr id="128" name="Image 127"/>
+          <p:cNvPicPr>
+            <a:picLocks noChangeAspect="1"/>
+          </p:cNvPicPr>
+          <p:nvPr/>
+        </p:nvPicPr>
+        <p:blipFill>
+          <a:blip r:embed="rId8"/>
+          <a:srcRect/>
+          <a:stretch>
+            <a:fillRect/>
+          </a:stretch>
+        </p:blipFill>
+        <p:spPr>
+          <a:xfrm flipH="1">
+            <a:off x="7262073" y="1968604"/>
+            <a:ext cx="1480360" cy="1722333"/>
+          </a:xfrm>
+          <a:prstGeom prst="rect">
+            <a:avLst/>
+          </a:prstGeom>
+        </p:spPr>
+      </p:pic>
+      <p:sp>
+        <p:nvSpPr>
+          <p:cNvPr id="129" name="BoîteDeDialogue 128"/>
+          <p:cNvSpPr txBox="1"/>
+          <p:nvPr/>
+        </p:nvSpPr>
+        <p:spPr>
+          <a:xfrm>
+            <a:off x="671660" y="4560217"/>
+            <a:ext cx="7877273" cy="317048"/>
+          </a:xfrm>
+          <a:prstGeom prst="rect">
+            <a:avLst/>
+          </a:prstGeom>
+          <a:noFill/>
+        </p:spPr>
+        <p:txBody>
+          <a:bodyPr wrap="square" rtlCol="0">
+            <a:spAutoFit/>
+          </a:bodyPr>
+          <a:lstStyle/>
+          <a:p>
+            <a:r>
+              <a:rPr lang="en-US" sz="1500"/>
+              <a:t>Wakelet : https://wakelet.com/wake/T-jRNu5XQny6kX0IzfEOf</a:t>
+            </a:r>
+            <a:endParaRPr lang="en-US"/>
+          </a:p>
+        </p:txBody>
+      </p:sp>
     </p:spTree>
   </p:cSld>
   <p:clrMapOvr>
@@ -9101,6 +9484,281 @@
         </p:nvSpPr>
         <p:spPr>
           <a:xfrm>
+            <a:off x="311700" y="445025"/>
+            <a:ext cx="8520600" cy="572700"/>
+          </a:xfrm>
+          <a:prstGeom prst="rect">
+            <a:avLst/>
+          </a:prstGeom>
+        </p:spPr>
+        <p:txBody>
+          <a:bodyPr spcFirstLastPara="1" wrap="square" lIns="91425" tIns="91425" rIns="91425" bIns="91425" anchor="t">
+            <a:normAutofit/>
+          </a:bodyPr>
+          <a:lstStyle/>
+          <a:p>
+            <a:pPr marL="0" indent="0" algn="l" rtl="0">
+              <a:lnSpc>
+                <a:spcPct val="115000"/>
+              </a:lnSpc>
+              <a:spcBef>
+                <a:spcPts val="0"/>
+              </a:spcBef>
+              <a:spcAft>
+                <a:spcPts val="1200"/>
+              </a:spcAft>
+              <a:buNone/>
+            </a:pPr>
+            <a:r>
+              <a:rPr lang="en-US" sz="2000">
+                <a:latin typeface="Arial"/>
+                <a:ea typeface="Arial"/>
+                <a:cs typeface="Arial"/>
+                <a:sym typeface="Montserrat" pitchFamily="18" charset="0"/>
+              </a:rPr>
+              <a:t>API Instagram</a:t>
+            </a:r>
+            <a:r>
+              <a:rPr lang="fr" sz="2000">
+                <a:latin typeface="Arial"/>
+                <a:ea typeface="Arial"/>
+                <a:cs typeface="Arial"/>
+                <a:sym typeface="Montserrat" pitchFamily="18" charset="0"/>
+              </a:rPr>
+              <a:t> </a:t>
+            </a:r>
+            <a:r>
+              <a:rPr lang="en-US" sz="2000">
+                <a:latin typeface="Arial"/>
+                <a:ea typeface="Arial"/>
+                <a:cs typeface="Arial"/>
+                <a:sym typeface="Montserrat" pitchFamily="18" charset="0"/>
+              </a:rPr>
+              <a:t>:</a:t>
+            </a:r>
+            <a:endParaRPr sz="3000">
+              <a:latin typeface="Arial"/>
+              <a:ea typeface="Arial"/>
+              <a:cs typeface="Arial"/>
+              <a:sym typeface="Montserrat" pitchFamily="18" charset="0"/>
+            </a:endParaRPr>
+          </a:p>
+        </p:txBody>
+      </p:sp>
+      <p:sp>
+        <p:nvSpPr>
+          <p:cNvPr id="86" name="Google Shape;86;p17"/>
+          <p:cNvSpPr/>
+          <p:nvPr/>
+        </p:nvSpPr>
+        <p:spPr>
+          <a:xfrm>
+            <a:off x="-4800" y="0"/>
+            <a:ext cx="9153600" cy="239700"/>
+          </a:xfrm>
+          <a:prstGeom prst="rect">
+            <a:avLst/>
+          </a:prstGeom>
+          <a:solidFill>
+            <a:srgbClr val="FCE5CD"/>
+          </a:solidFill>
+          <a:ln w="9525" cap="flat" cmpd="sng">
+            <a:solidFill>
+              <a:srgbClr val="F7EDDE"/>
+            </a:solidFill>
+            <a:prstDash val="solid"/>
+            <a:round/>
+            <a:headEnd type="none" w="sm" len="sm"/>
+            <a:tailEnd type="none" w="sm" len="sm"/>
+          </a:ln>
+        </p:spPr>
+        <p:txBody>
+          <a:bodyPr spcFirstLastPara="1" wrap="square" lIns="91425" tIns="91425" rIns="91425" bIns="91425" anchor="ctr">
+            <a:noAutofit/>
+          </a:bodyPr>
+          <a:lstStyle/>
+          <a:p>
+            <a:pPr marL="0" indent="0" algn="ctr" rtl="0">
+              <a:spcBef>
+                <a:spcPts val="0"/>
+              </a:spcBef>
+              <a:spcAft>
+                <a:spcPts val="0"/>
+              </a:spcAft>
+              <a:buNone/>
+            </a:pPr>
+          </a:p>
+        </p:txBody>
+      </p:sp>
+      <p:pic>
+        <p:nvPicPr>
+          <p:cNvPr id="87" name="Google Shape;87;p17"/>
+          <p:cNvPicPr preferRelativeResize="0"/>
+          <p:nvPr/>
+        </p:nvPicPr>
+        <p:blipFill>
+          <a:blip r:embed="rId1">
+            <a:alphaModFix/>
+          </a:blip>
+          <a:srcRect/>
+          <a:stretch>
+            <a:fillRect/>
+          </a:stretch>
+        </p:blipFill>
+        <p:spPr>
+          <a:xfrm>
+            <a:off x="8469575" y="-4"/>
+            <a:ext cx="674425" cy="340550"/>
+          </a:xfrm>
+          <a:prstGeom prst="rect">
+            <a:avLst/>
+          </a:prstGeom>
+          <a:noFill/>
+          <a:ln>
+            <a:noFill/>
+          </a:ln>
+        </p:spPr>
+      </p:pic>
+      <p:sp>
+        <p:nvSpPr>
+          <p:cNvPr id="95" name="BoîteDeDialogue 94"/>
+          <p:cNvSpPr txBox="1"/>
+          <p:nvPr/>
+        </p:nvSpPr>
+        <p:spPr>
+          <a:xfrm>
+            <a:off x="348627" y="946275"/>
+            <a:ext cx="8458161" cy="1460048"/>
+          </a:xfrm>
+          <a:prstGeom prst="rect">
+            <a:avLst/>
+          </a:prstGeom>
+          <a:noFill/>
+        </p:spPr>
+        <p:txBody>
+          <a:bodyPr wrap="square" rtlCol="0">
+            <a:spAutoFit/>
+          </a:bodyPr>
+          <a:lstStyle/>
+          <a:p>
+            <a:r>
+              <a:rPr lang="en-US" sz="1500"/>
+              <a:t>Afin de maximiser l'attrait de menu-maker nous utiliserons l'API Graph d'Instagram qui permettra pour les comptes business et Creator :</a:t>
+            </a:r>
+          </a:p>
+          <a:p>
+            <a:r>
+              <a:rPr lang="en-US" sz="1500"/>
+              <a:t>- de publier et de récupérer du contenu </a:t>
+            </a:r>
+          </a:p>
+          <a:p>
+            <a:r>
+              <a:rPr lang="en-US" sz="1500"/>
+              <a:t>- de Modérer les commentaires "Réponse/suppression"? </a:t>
+            </a:r>
+          </a:p>
+          <a:p>
+            <a:r>
+              <a:rPr lang="en-US" sz="1500"/>
+              <a:t>- d'être identifié mentionné avec les #</a:t>
+            </a:r>
+          </a:p>
+          <a:p>
+            <a:r>
+              <a:rPr lang="en-US" sz="1500"/>
+              <a:t>- Obtenir des informations sur les concurrents sous forme de métadonnées.</a:t>
+            </a:r>
+          </a:p>
+        </p:txBody>
+      </p:sp>
+      <p:pic>
+        <p:nvPicPr>
+          <p:cNvPr id="97" name="Image 96"/>
+          <p:cNvPicPr>
+            <a:picLocks noChangeAspect="1"/>
+          </p:cNvPicPr>
+          <p:nvPr/>
+        </p:nvPicPr>
+        <p:blipFill>
+          <a:blip r:embed="rId2"/>
+          <a:srcRect/>
+          <a:stretch>
+            <a:fillRect/>
+          </a:stretch>
+        </p:blipFill>
+        <p:spPr>
+          <a:xfrm>
+            <a:off x="412194" y="2406323"/>
+            <a:ext cx="2809962" cy="2551244"/>
+          </a:xfrm>
+          <a:prstGeom prst="rect">
+            <a:avLst/>
+          </a:prstGeom>
+        </p:spPr>
+      </p:pic>
+      <p:pic>
+        <p:nvPicPr>
+          <p:cNvPr id="98" name="Image 97"/>
+          <p:cNvPicPr>
+            <a:picLocks noChangeAspect="1"/>
+          </p:cNvPicPr>
+          <p:nvPr/>
+        </p:nvPicPr>
+        <p:blipFill>
+          <a:blip r:embed="rId3"/>
+          <a:srcRect/>
+          <a:stretch>
+            <a:fillRect/>
+          </a:stretch>
+        </p:blipFill>
+        <p:spPr>
+          <a:xfrm>
+            <a:off x="3364502" y="2876603"/>
+            <a:ext cx="4930105" cy="1519443"/>
+          </a:xfrm>
+          <a:prstGeom prst="rect">
+            <a:avLst/>
+          </a:prstGeom>
+        </p:spPr>
+      </p:pic>
+    </p:spTree>
+  </p:cSld>
+  <p:clrMapOvr>
+    <a:masterClrMapping/>
+  </p:clrMapOvr>
+</p:sld>
+</file>
+
+<file path=ppt/slides/slide15.xml><?xml version="1.0" encoding="utf-8"?>
+<p:sld xmlns:a="http://schemas.openxmlformats.org/drawingml/2006/main" xmlns:r="http://schemas.openxmlformats.org/officeDocument/2006/relationships" xmlns:p="http://schemas.openxmlformats.org/presentationml/2006/main">
+  <p:cSld>
+    <p:spTree>
+      <p:nvGrpSpPr>
+        <p:cNvPr id="1" name=""/>
+        <p:cNvGrpSpPr/>
+        <p:nvPr/>
+      </p:nvGrpSpPr>
+      <p:grpSpPr>
+        <a:xfrm>
+          <a:off x="0" y="0"/>
+          <a:ext cx="0" cy="0"/>
+          <a:chOff x="0" y="0"/>
+          <a:chExt cx="0" cy="0"/>
+        </a:xfrm>
+      </p:grpSpPr>
+      <p:sp>
+        <p:nvSpPr>
+          <p:cNvPr id="84" name="Google Shape;84;p17"/>
+          <p:cNvSpPr>
+            <a:spLocks noGrp="1" noEditPoints="1"/>
+          </p:cNvSpPr>
+          <p:nvPr>
+            <p:ph type="title"/>
+          </p:nvPr>
+        </p:nvSpPr>
+        <p:spPr>
+          <a:xfrm>
             <a:off x="229098" y="445025"/>
             <a:ext cx="8603202" cy="572700"/>
           </a:xfrm>
@@ -9350,7 +10008,7 @@
 </p:sld>
 </file>
 
-<file path=ppt/slides/slide15.xml><?xml version="1.0" encoding="utf-8"?>
+<file path=ppt/slides/slide16.xml><?xml version="1.0" encoding="utf-8"?>
 <p:sld xmlns:a="http://schemas.openxmlformats.org/drawingml/2006/main" xmlns:r="http://schemas.openxmlformats.org/officeDocument/2006/relationships" xmlns:p="http://schemas.openxmlformats.org/presentationml/2006/main">
   <p:cSld>
     <p:spTree>
@@ -9991,7 +10649,7 @@
 </p:sld>
 </file>
 
-<file path=ppt/slides/slide16.xml><?xml version="1.0" encoding="utf-8"?>
+<file path=ppt/slides/slide17.xml><?xml version="1.0" encoding="utf-8"?>
 <p:sld xmlns:a="http://schemas.openxmlformats.org/drawingml/2006/main" xmlns:r="http://schemas.openxmlformats.org/officeDocument/2006/relationships" xmlns:p="http://schemas.openxmlformats.org/presentationml/2006/main">
   <p:cSld>
     <p:spTree>
@@ -10460,7 +11118,7 @@
 </p:sld>
 </file>
 
-<file path=ppt/slides/slide17.xml><?xml version="1.0" encoding="utf-8"?>
+<file path=ppt/slides/slide18.xml><?xml version="1.0" encoding="utf-8"?>
 <p:sld xmlns:a="http://schemas.openxmlformats.org/drawingml/2006/main" xmlns:r="http://schemas.openxmlformats.org/officeDocument/2006/relationships" xmlns:p="http://schemas.openxmlformats.org/presentationml/2006/main">
   <p:cSld>
     <p:bg>
@@ -13693,7 +14351,7 @@
       </p:grpSpPr>
       <p:sp>
         <p:nvSpPr>
-          <p:cNvPr id="101" name="Google Shape;101;p19"/>
+          <p:cNvPr id="84" name="Google Shape;84;p17"/>
           <p:cNvSpPr>
             <a:spLocks noGrp="1" noEditPoints="1"/>
           </p:cNvSpPr>
@@ -13718,7 +14376,7 @@
           <a:p>
             <a:pPr marL="0" indent="0" algn="l" rtl="0">
               <a:lnSpc>
-                <a:spcPct val="115000"/>
+                <a:spcPct val="100000"/>
               </a:lnSpc>
               <a:spcBef>
                 <a:spcPts val="0"/>
@@ -13729,18 +14387,15 @@
               <a:buNone/>
             </a:pPr>
             <a:r>
-              <a:rPr lang="fr-BE" sz="2000">
+              <a:rPr lang="en-US" sz="3000">
                 <a:latin typeface="Arial"/>
                 <a:ea typeface="Arial"/>
                 <a:cs typeface="Arial"/>
                 <a:sym typeface="Montserrat" pitchFamily="18" charset="0"/>
               </a:rPr>
-              <a:t>Les outils de développent</a:t>
+              <a:t>Plan de communication</a:t>
             </a:r>
-            <a:endParaRPr lang="fr-BE" sz="1800">
-              <a:solidFill>
-                <a:schemeClr val="dk2"/>
-              </a:solidFill>
+            <a:endParaRPr sz="3000">
               <a:latin typeface="Arial"/>
               <a:ea typeface="Arial"/>
               <a:cs typeface="Arial"/>
@@ -13751,7 +14406,7 @@
       </p:sp>
       <p:sp>
         <p:nvSpPr>
-          <p:cNvPr id="102" name="Google Shape;102;p19"/>
+          <p:cNvPr id="85" name="Google Shape;85;p17"/>
           <p:cNvSpPr>
             <a:spLocks noGrp="1" noEditPoints="1"/>
           </p:cNvSpPr>
@@ -13761,8 +14416,8 @@
         </p:nvSpPr>
         <p:spPr>
           <a:xfrm>
-            <a:off x="311700" y="1152475"/>
-            <a:ext cx="8520600" cy="3416400"/>
+            <a:off x="34654" y="1017725"/>
+            <a:ext cx="8903135" cy="835812"/>
           </a:xfrm>
           <a:prstGeom prst="rect">
             <a:avLst/>
@@ -13774,127 +14429,69 @@
           </a:bodyPr>
           <a:lstStyle/>
           <a:p>
-            <a:pPr marL="0" indent="0" algn="l" rtl="0">
-              <a:spcBef>
-                <a:spcPts val="0"/>
-              </a:spcBef>
-              <a:spcAft>
-                <a:spcPts val="0"/>
-              </a:spcAft>
-              <a:buNone/>
-            </a:pPr>
-            <a:endParaRPr>
-              <a:latin typeface="Montserrat" pitchFamily="18" charset="0"/>
-              <a:ea typeface="Montserrat" pitchFamily="18" charset="0"/>
-              <a:cs typeface="Montserrat" pitchFamily="18" charset="0"/>
-              <a:sym typeface="Montserrat" pitchFamily="18" charset="0"/>
-            </a:endParaRPr>
-          </a:p>
-          <a:p>
-            <a:pPr marL="0" indent="0" algn="l" rtl="0">
-              <a:spcBef>
-                <a:spcPts val="1200"/>
-              </a:spcBef>
-              <a:spcAft>
-                <a:spcPts val="0"/>
-              </a:spcAft>
-              <a:buNone/>
-            </a:pPr>
-            <a:endParaRPr>
-              <a:latin typeface="Montserrat" pitchFamily="18" charset="0"/>
-              <a:ea typeface="Montserrat" pitchFamily="18" charset="0"/>
-              <a:cs typeface="Montserrat" pitchFamily="18" charset="0"/>
-              <a:sym typeface="Montserrat" pitchFamily="18" charset="0"/>
-            </a:endParaRPr>
-          </a:p>
-          <a:p>
-            <a:pPr marL="457200" indent="0" algn="l" rtl="0">
-              <a:spcBef>
-                <a:spcPts val="1200"/>
-              </a:spcBef>
-              <a:spcAft>
-                <a:spcPts val="1200"/>
-              </a:spcAft>
-              <a:buNone/>
-            </a:pPr>
-            <a:endParaRPr>
-              <a:latin typeface="Montserrat" pitchFamily="18" charset="0"/>
-              <a:ea typeface="Montserrat" pitchFamily="18" charset="0"/>
-              <a:cs typeface="Montserrat" pitchFamily="18" charset="0"/>
-              <a:sym typeface="Montserrat" pitchFamily="18" charset="0"/>
-            </a:endParaRPr>
-          </a:p>
-        </p:txBody>
-      </p:sp>
-      <p:sp>
-        <p:nvSpPr>
-          <p:cNvPr id="103" name="Google Shape;103;p19"/>
-          <p:cNvSpPr txBox="1"/>
-          <p:nvPr/>
-        </p:nvSpPr>
-        <p:spPr>
-          <a:xfrm>
-            <a:off x="0" y="0"/>
-            <a:ext cx="4911600" cy="356914"/>
-          </a:xfrm>
-          <a:prstGeom prst="rect">
-            <a:avLst/>
-          </a:prstGeom>
-          <a:noFill/>
-          <a:ln>
-            <a:noFill/>
-          </a:ln>
-        </p:spPr>
-        <p:txBody>
-          <a:bodyPr spcFirstLastPara="1" wrap="square" lIns="91425" tIns="91425" rIns="91425" bIns="91425" anchor="t">
-            <a:spAutoFit/>
-          </a:bodyPr>
-          <a:lstStyle/>
-          <a:p>
-            <a:pPr marL="0" indent="0" algn="l" rtl="0">
-              <a:lnSpc>
-                <a:spcPct val="115000"/>
-              </a:lnSpc>
-              <a:spcBef>
-                <a:spcPts val="0"/>
-              </a:spcBef>
-              <a:spcAft>
-                <a:spcPts val="1200"/>
-              </a:spcAft>
-              <a:buNone/>
-            </a:pPr>
-            <a:endParaRPr sz="1000"/>
-          </a:p>
-        </p:txBody>
-      </p:sp>
-      <p:sp>
-        <p:nvSpPr>
-          <p:cNvPr id="104" name="Google Shape;104;p19"/>
-          <p:cNvSpPr txBox="1"/>
-          <p:nvPr/>
-        </p:nvSpPr>
-        <p:spPr>
-          <a:xfrm>
-            <a:off x="434775" y="1085525"/>
-            <a:ext cx="8320500" cy="1099029"/>
-          </a:xfrm>
-          <a:prstGeom prst="rect">
-            <a:avLst/>
-          </a:prstGeom>
-          <a:noFill/>
-          <a:ln>
-            <a:noFill/>
-          </a:ln>
-        </p:spPr>
-        <p:txBody>
-          <a:bodyPr spcFirstLastPara="1" wrap="square" lIns="91425" tIns="91425" rIns="91425" bIns="91425" anchor="t">
-            <a:spAutoFit/>
-          </a:bodyPr>
-          <a:lstStyle/>
-          <a:p>
             <a:pPr marL="133350" indent="0" algn="l" rtl="0">
               <a:lnSpc>
-                <a:spcPct val="150000"/>
+                <a:spcPct val="100000"/>
+              </a:lnSpc>
+              <a:spcBef>
+                <a:spcPts val="0"/>
+              </a:spcBef>
+              <a:spcAft>
+                <a:spcPts val="0"/>
+              </a:spcAft>
+              <a:buFont typeface="Montserrat" pitchFamily="18" charset="0"/>
+              <a:buNone/>
+            </a:pPr>
+            <a:r>
+              <a:rPr lang="en-US" sz="1500">
+                <a:solidFill>
+                  <a:srgbClr val="0D0D0D"/>
+                </a:solidFill>
+                <a:highlight>
+                  <a:srgbClr val="FFFFFF"/>
+                </a:highlight>
+                <a:latin typeface="Arial"/>
+                <a:ea typeface="Arial"/>
+                <a:cs typeface="Arial"/>
+                <a:sym typeface="Montserrat" pitchFamily="18" charset="0"/>
+              </a:rPr>
+              <a:t>Afin de renforcer la communication, l'entente et bien entendu la communication au sein de l'équipe, tous les matins, une réunion sera tenue. Elle durera entre 15 et 30 min durant laquelle </a:t>
+            </a:r>
+          </a:p>
+          <a:p>
+            <a:pPr marL="133350" indent="0" algn="l" rtl="0">
+              <a:lnSpc>
+                <a:spcPct val="100000"/>
+              </a:lnSpc>
+              <a:spcBef>
+                <a:spcPts val="0"/>
+              </a:spcBef>
+              <a:spcAft>
+                <a:spcPts val="0"/>
+              </a:spcAft>
+              <a:buFont typeface="Montserrat" pitchFamily="18" charset="0"/>
+              <a:buNone/>
+            </a:pPr>
+            <a:r>
+              <a:rPr lang="en-US" sz="1500">
+                <a:solidFill>
+                  <a:srgbClr val="0D0D0D"/>
+                </a:solidFill>
+                <a:highlight>
+                  <a:srgbClr val="FFFFFF"/>
+                </a:highlight>
+                <a:latin typeface="Arial"/>
+                <a:ea typeface="Arial"/>
+                <a:cs typeface="Arial"/>
+                <a:sym typeface="Montserrat" pitchFamily="18" charset="0"/>
+              </a:rPr>
+              <a:t>chaqu'un des membres de l'équipe pourra :</a:t>
+            </a:r>
+          </a:p>
+          <a:p>
+            <a:pPr marL="133350" indent="0" algn="l" rtl="0">
+              <a:lnSpc>
+                <a:spcPct val="100000"/>
               </a:lnSpc>
               <a:spcBef>
                 <a:spcPts val="0"/>
@@ -13921,7 +14518,7 @@
           <a:p>
             <a:pPr marL="0" indent="0" algn="l" rtl="0">
               <a:lnSpc>
-                <a:spcPct val="115000"/>
+                <a:spcPct val="100000"/>
               </a:lnSpc>
               <a:spcBef>
                 <a:spcPts val="0"/>
@@ -13931,10 +14528,7 @@
               </a:spcAft>
               <a:buNone/>
             </a:pPr>
-            <a:endParaRPr sz="1200" i="1">
-              <a:solidFill>
-                <a:schemeClr val="dk1"/>
-              </a:solidFill>
+            <a:endParaRPr>
               <a:latin typeface="Montserrat" pitchFamily="18" charset="0"/>
               <a:ea typeface="Montserrat" pitchFamily="18" charset="0"/>
               <a:cs typeface="Montserrat" pitchFamily="18" charset="0"/>
@@ -13943,6 +14537,9 @@
           </a:p>
           <a:p>
             <a:pPr marL="0" indent="0" algn="l" rtl="0">
+              <a:lnSpc>
+                <a:spcPct val="100000"/>
+              </a:lnSpc>
               <a:spcBef>
                 <a:spcPts val="1200"/>
               </a:spcBef>
@@ -13951,12 +14548,38 @@
               </a:spcAft>
               <a:buNone/>
             </a:pPr>
+            <a:endParaRPr>
+              <a:latin typeface="Montserrat" pitchFamily="18" charset="0"/>
+              <a:ea typeface="Montserrat" pitchFamily="18" charset="0"/>
+              <a:cs typeface="Montserrat" pitchFamily="18" charset="0"/>
+              <a:sym typeface="Montserrat" pitchFamily="18" charset="0"/>
+            </a:endParaRPr>
+          </a:p>
+          <a:p>
+            <a:pPr marL="457200" indent="0" algn="l" rtl="0">
+              <a:lnSpc>
+                <a:spcPct val="100000"/>
+              </a:lnSpc>
+              <a:spcBef>
+                <a:spcPts val="1200"/>
+              </a:spcBef>
+              <a:spcAft>
+                <a:spcPts val="1200"/>
+              </a:spcAft>
+              <a:buNone/>
+            </a:pPr>
+            <a:endParaRPr>
+              <a:latin typeface="Montserrat" pitchFamily="18" charset="0"/>
+              <a:ea typeface="Montserrat" pitchFamily="18" charset="0"/>
+              <a:cs typeface="Montserrat" pitchFamily="18" charset="0"/>
+              <a:sym typeface="Montserrat" pitchFamily="18" charset="0"/>
+            </a:endParaRPr>
           </a:p>
         </p:txBody>
       </p:sp>
       <p:sp>
         <p:nvSpPr>
-          <p:cNvPr id="105" name="Google Shape;105;p19"/>
+          <p:cNvPr id="86" name="Google Shape;86;p17"/>
           <p:cNvSpPr/>
           <p:nvPr/>
         </p:nvSpPr>
@@ -14001,7 +14624,7 @@
       </p:sp>
       <p:pic>
         <p:nvPicPr>
-          <p:cNvPr id="106" name="Google Shape;106;p19"/>
+          <p:cNvPr id="87" name="Google Shape;87;p17"/>
           <p:cNvPicPr preferRelativeResize="0"/>
           <p:nvPr/>
         </p:nvPicPr>
@@ -14028,38 +14651,9 @@
           </a:ln>
         </p:spPr>
       </p:pic>
-      <p:sp>
-        <p:nvSpPr>
-          <p:cNvPr id="112" name="BoîteDeDialogue 111"/>
-          <p:cNvSpPr txBox="1"/>
-          <p:nvPr/>
-        </p:nvSpPr>
-        <p:spPr>
-          <a:xfrm>
-            <a:off x="434775" y="1017725"/>
-            <a:ext cx="7810188" cy="774248"/>
-          </a:xfrm>
-          <a:prstGeom prst="rect">
-            <a:avLst/>
-          </a:prstGeom>
-          <a:noFill/>
-        </p:spPr>
-        <p:txBody>
-          <a:bodyPr wrap="square" rtlCol="0">
-            <a:spAutoFit/>
-          </a:bodyPr>
-          <a:lstStyle/>
-          <a:p>
-            <a:r>
-              <a:rPr lang="en-US" sz="1500"/>
-              <a:t>Pour ce projet, nous ferons appel aux services d'un de Front-end ainsi que d'un de Back-end. Il est donc important de prendre en compte leur domaine de compétences et de mettre en place un environnement de travail facilitant les échanges entre eux.</a:t>
-            </a:r>
-          </a:p>
-        </p:txBody>
-      </p:sp>
       <p:pic>
         <p:nvPicPr>
-          <p:cNvPr id="114" name="Image 113"/>
+          <p:cNvPr id="90" name="Image 89"/>
           <p:cNvPicPr>
             <a:picLocks noChangeAspect="1"/>
           </p:cNvPicPr>
@@ -14074,17 +14668,469 @@
         </p:blipFill>
         <p:spPr>
           <a:xfrm>
-            <a:off x="5661269" y="2049663"/>
-            <a:ext cx="1025326" cy="1044174"/>
+            <a:off x="6675031" y="1653217"/>
+            <a:ext cx="1794544" cy="1186997"/>
           </a:xfrm>
           <a:prstGeom prst="rect">
             <a:avLst/>
           </a:prstGeom>
         </p:spPr>
       </p:pic>
+      <p:sp>
+        <p:nvSpPr>
+          <p:cNvPr id="91" name="BoîteDeDialogue 90"/>
+          <p:cNvSpPr txBox="1"/>
+          <p:nvPr/>
+        </p:nvSpPr>
+        <p:spPr>
+          <a:xfrm>
+            <a:off x="0" y="1853537"/>
+            <a:ext cx="6679833" cy="3059795"/>
+          </a:xfrm>
+          <a:prstGeom prst="rect">
+            <a:avLst/>
+          </a:prstGeom>
+          <a:noFill/>
+        </p:spPr>
+        <p:txBody>
+          <a:bodyPr wrap="square" rtlCol="0">
+            <a:spAutoFit/>
+          </a:bodyPr>
+          <a:lstStyle/>
+          <a:p>
+            <a:pPr marL="133350" indent="0" algn="l" rtl="0">
+              <a:lnSpc>
+                <a:spcPct val="100000"/>
+              </a:lnSpc>
+              <a:spcBef>
+                <a:spcPts val="0"/>
+              </a:spcBef>
+              <a:spcAft>
+                <a:spcPts val="0"/>
+              </a:spcAft>
+              <a:buFont typeface="Montserrat" pitchFamily="18" charset="0"/>
+              <a:buNone/>
+            </a:pPr>
+            <a:r>
+              <a:rPr lang="en-US" sz="1500">
+                <a:solidFill>
+                  <a:srgbClr val="0D0D0D"/>
+                </a:solidFill>
+                <a:highlight>
+                  <a:srgbClr val="FFFFFF"/>
+                </a:highlight>
+                <a:latin typeface="Arial"/>
+                <a:ea typeface="Arial"/>
+                <a:cs typeface="Arial"/>
+                <a:sym typeface="Montserrat" pitchFamily="18" charset="0"/>
+              </a:rPr>
+              <a:t>- Donner son ressenti sur la journée grâce à des smileys afin de le faire connaître à l'ensemble de l'équipe et l'accrocher dans un tableau pour s'assurer que l'équipe prend du plaisir à travailler sur ce projet au cours du temps.</a:t>
+            </a:r>
+          </a:p>
+          <a:p>
+            <a:pPr marL="133350" indent="0" algn="l" rtl="0">
+              <a:lnSpc>
+                <a:spcPct val="100000"/>
+              </a:lnSpc>
+              <a:spcBef>
+                <a:spcPts val="0"/>
+              </a:spcBef>
+              <a:spcAft>
+                <a:spcPts val="0"/>
+              </a:spcAft>
+              <a:buFont typeface="Montserrat" pitchFamily="18" charset="0"/>
+              <a:buNone/>
+            </a:pPr>
+            <a:r>
+              <a:rPr lang="en-US" sz="1500">
+                <a:solidFill>
+                  <a:srgbClr val="0D0D0D"/>
+                </a:solidFill>
+                <a:highlight>
+                  <a:srgbClr val="FFFFFF"/>
+                </a:highlight>
+                <a:latin typeface="Arial"/>
+                <a:ea typeface="Arial"/>
+                <a:cs typeface="Arial"/>
+                <a:sym typeface="Montserrat" pitchFamily="18" charset="0"/>
+              </a:rPr>
+              <a:t> </a:t>
+            </a:r>
+          </a:p>
+          <a:p>
+            <a:pPr marL="133350" indent="0" algn="l" rtl="0">
+              <a:lnSpc>
+                <a:spcPct val="100000"/>
+              </a:lnSpc>
+              <a:spcBef>
+                <a:spcPts val="0"/>
+              </a:spcBef>
+              <a:spcAft>
+                <a:spcPts val="0"/>
+              </a:spcAft>
+              <a:buFont typeface="Montserrat" pitchFamily="18" charset="0"/>
+              <a:buNone/>
+            </a:pPr>
+            <a:r>
+              <a:rPr lang="en-US" sz="1500">
+                <a:solidFill>
+                  <a:srgbClr val="0D0D0D"/>
+                </a:solidFill>
+                <a:highlight>
+                  <a:srgbClr val="FFFFFF"/>
+                </a:highlight>
+                <a:latin typeface="Arial"/>
+                <a:ea typeface="Arial"/>
+                <a:cs typeface="Arial"/>
+                <a:sym typeface="Montserrat" pitchFamily="18" charset="0"/>
+              </a:rPr>
+              <a:t>- Parler des réussites/difficultés rencontrées</a:t>
+            </a:r>
+          </a:p>
+          <a:p>
+            <a:pPr marL="133350" indent="0" algn="l" rtl="0">
+              <a:lnSpc>
+                <a:spcPct val="100000"/>
+              </a:lnSpc>
+              <a:spcBef>
+                <a:spcPts val="0"/>
+              </a:spcBef>
+              <a:spcAft>
+                <a:spcPts val="0"/>
+              </a:spcAft>
+              <a:buFont typeface="Montserrat" pitchFamily="18" charset="0"/>
+              <a:buNone/>
+            </a:pPr>
+            <a:endParaRPr lang="en-US" sz="1500">
+              <a:solidFill>
+                <a:srgbClr val="0D0D0D"/>
+              </a:solidFill>
+              <a:highlight>
+                <a:srgbClr val="FFFFFF"/>
+              </a:highlight>
+              <a:latin typeface="Arial"/>
+              <a:ea typeface="Arial"/>
+              <a:cs typeface="Arial"/>
+              <a:sym typeface="Montserrat" pitchFamily="18" charset="0"/>
+            </a:endParaRPr>
+          </a:p>
+          <a:p>
+            <a:pPr marL="133350" indent="0" algn="l" rtl="0">
+              <a:lnSpc>
+                <a:spcPct val="100000"/>
+              </a:lnSpc>
+              <a:spcBef>
+                <a:spcPts val="0"/>
+              </a:spcBef>
+              <a:spcAft>
+                <a:spcPts val="0"/>
+              </a:spcAft>
+              <a:buFont typeface="Montserrat" pitchFamily="18" charset="0"/>
+              <a:buNone/>
+            </a:pPr>
+            <a:r>
+              <a:rPr lang="en-US" sz="1500">
+                <a:solidFill>
+                  <a:srgbClr val="0D0D0D"/>
+                </a:solidFill>
+                <a:highlight>
+                  <a:srgbClr val="FFFFFF"/>
+                </a:highlight>
+                <a:latin typeface="Arial"/>
+                <a:ea typeface="Arial"/>
+                <a:cs typeface="Arial"/>
+                <a:sym typeface="Montserrat" pitchFamily="18" charset="0"/>
+              </a:rPr>
+              <a:t>- Donner son avis sur le projet</a:t>
+            </a:r>
+          </a:p>
+          <a:p>
+            <a:pPr marL="133350" indent="0" algn="l" rtl="0">
+              <a:lnSpc>
+                <a:spcPct val="100000"/>
+              </a:lnSpc>
+              <a:spcBef>
+                <a:spcPts val="0"/>
+              </a:spcBef>
+              <a:spcAft>
+                <a:spcPts val="0"/>
+              </a:spcAft>
+              <a:buFont typeface="Montserrat" pitchFamily="18" charset="0"/>
+              <a:buNone/>
+            </a:pPr>
+            <a:endParaRPr lang="en-US" sz="1500">
+              <a:solidFill>
+                <a:srgbClr val="0D0D0D"/>
+              </a:solidFill>
+              <a:highlight>
+                <a:srgbClr val="FFFFFF"/>
+              </a:highlight>
+              <a:latin typeface="Arial"/>
+              <a:ea typeface="Arial"/>
+              <a:cs typeface="Arial"/>
+              <a:sym typeface="Montserrat" pitchFamily="18" charset="0"/>
+            </a:endParaRPr>
+          </a:p>
+          <a:p>
+            <a:pPr marL="133350" indent="0" algn="l" rtl="0">
+              <a:lnSpc>
+                <a:spcPct val="100000"/>
+              </a:lnSpc>
+              <a:spcBef>
+                <a:spcPts val="0"/>
+              </a:spcBef>
+              <a:spcAft>
+                <a:spcPts val="0"/>
+              </a:spcAft>
+              <a:buFont typeface="Montserrat" pitchFamily="18" charset="0"/>
+              <a:buNone/>
+            </a:pPr>
+            <a:r>
+              <a:rPr lang="en-US" sz="1500">
+                <a:solidFill>
+                  <a:srgbClr val="0D0D0D"/>
+                </a:solidFill>
+                <a:highlight>
+                  <a:srgbClr val="FFFFFF"/>
+                </a:highlight>
+                <a:latin typeface="Arial"/>
+                <a:ea typeface="Arial"/>
+                <a:cs typeface="Arial"/>
+                <a:sym typeface="Montserrat" pitchFamily="18" charset="0"/>
+              </a:rPr>
+              <a:t>- Partager quelque chose qui lui tient à cœur avec l'équipe  </a:t>
+            </a:r>
+          </a:p>
+          <a:p>
+            <a:pPr marL="133350" indent="0" algn="l" rtl="0">
+              <a:lnSpc>
+                <a:spcPct val="100000"/>
+              </a:lnSpc>
+              <a:spcBef>
+                <a:spcPts val="0"/>
+              </a:spcBef>
+              <a:spcAft>
+                <a:spcPts val="0"/>
+              </a:spcAft>
+              <a:buFont typeface="Montserrat" pitchFamily="18" charset="0"/>
+              <a:buNone/>
+            </a:pPr>
+            <a:endParaRPr lang="en-US" sz="1500">
+              <a:solidFill>
+                <a:srgbClr val="0D0D0D"/>
+              </a:solidFill>
+              <a:highlight>
+                <a:srgbClr val="FFFFFF"/>
+              </a:highlight>
+              <a:latin typeface="Montserrat" pitchFamily="18" charset="0"/>
+              <a:ea typeface="Montserrat" pitchFamily="18" charset="0"/>
+              <a:cs typeface="Montserrat" pitchFamily="18" charset="0"/>
+              <a:sym typeface="Montserrat" pitchFamily="18" charset="0"/>
+            </a:endParaRPr>
+          </a:p>
+          <a:p>
+            <a:pPr marL="457200" indent="-323850" algn="l" rtl="0">
+              <a:lnSpc>
+                <a:spcPct val="100000"/>
+              </a:lnSpc>
+              <a:spcBef>
+                <a:spcPts val="0"/>
+              </a:spcBef>
+              <a:spcAft>
+                <a:spcPts val="0"/>
+              </a:spcAft>
+              <a:buClr>
+                <a:srgbClr val="0D0D0D"/>
+              </a:buClr>
+              <a:buSzPts val="1500"/>
+              <a:buFont typeface="Montserrat" pitchFamily="18" charset="0"/>
+              <a:buChar char="●"/>
+            </a:pPr>
+            <a:endParaRPr lang="en-US" sz="1500">
+              <a:solidFill>
+                <a:srgbClr val="0D0D0D"/>
+              </a:solidFill>
+              <a:highlight>
+                <a:srgbClr val="FFFFFF"/>
+              </a:highlight>
+              <a:latin typeface="Montserrat" pitchFamily="18" charset="0"/>
+              <a:ea typeface="Montserrat" pitchFamily="18" charset="0"/>
+              <a:cs typeface="Montserrat" pitchFamily="18" charset="0"/>
+              <a:sym typeface="Montserrat" pitchFamily="18" charset="0"/>
+            </a:endParaRPr>
+          </a:p>
+          <a:p>
+            <a:pPr marL="457200" indent="-323850" algn="l" rtl="0">
+              <a:lnSpc>
+                <a:spcPct val="100000"/>
+              </a:lnSpc>
+              <a:spcBef>
+                <a:spcPts val="0"/>
+              </a:spcBef>
+              <a:spcAft>
+                <a:spcPts val="0"/>
+              </a:spcAft>
+              <a:buClr>
+                <a:srgbClr val="0D0D0D"/>
+              </a:buClr>
+              <a:buSzPts val="1500"/>
+              <a:buFont typeface="Montserrat" pitchFamily="18" charset="0"/>
+              <a:buChar char="●"/>
+            </a:pPr>
+            <a:endParaRPr lang="en-US" sz="1500">
+              <a:solidFill>
+                <a:srgbClr val="0D0D0D"/>
+              </a:solidFill>
+              <a:highlight>
+                <a:srgbClr val="FFFFFF"/>
+              </a:highlight>
+              <a:latin typeface="Montserrat" pitchFamily="18" charset="0"/>
+              <a:ea typeface="Montserrat" pitchFamily="18" charset="0"/>
+              <a:cs typeface="Montserrat" pitchFamily="18" charset="0"/>
+              <a:sym typeface="Montserrat" pitchFamily="18" charset="0"/>
+            </a:endParaRPr>
+          </a:p>
+        </p:txBody>
+      </p:sp>
+      <p:sp>
+        <p:nvSpPr>
+          <p:cNvPr id="92" name="BoîteDeDialogue 91"/>
+          <p:cNvSpPr txBox="1"/>
+          <p:nvPr/>
+        </p:nvSpPr>
+        <p:spPr>
+          <a:xfrm>
+            <a:off x="0" y="2543668"/>
+            <a:ext cx="6243875" cy="759207"/>
+          </a:xfrm>
+          <a:prstGeom prst="rect">
+            <a:avLst/>
+          </a:prstGeom>
+          <a:noFill/>
+        </p:spPr>
+        <p:txBody>
+          <a:bodyPr wrap="square" rtlCol="0">
+            <a:spAutoFit/>
+          </a:bodyPr>
+          <a:lstStyle/>
+          <a:p>
+            <a:pPr marL="133350" indent="0" algn="l" rtl="0">
+              <a:lnSpc>
+                <a:spcPct val="100000"/>
+              </a:lnSpc>
+              <a:spcBef>
+                <a:spcPts val="0"/>
+              </a:spcBef>
+              <a:spcAft>
+                <a:spcPts val="0"/>
+              </a:spcAft>
+              <a:buFont typeface="Montserrat" pitchFamily="18" charset="0"/>
+              <a:buNone/>
+            </a:pPr>
+            <a:endParaRPr lang="en-US" sz="1500">
+              <a:solidFill>
+                <a:srgbClr val="0D0D0D"/>
+              </a:solidFill>
+              <a:highlight>
+                <a:srgbClr val="FFFFFF"/>
+              </a:highlight>
+              <a:latin typeface="Arial"/>
+              <a:ea typeface="Arial"/>
+              <a:cs typeface="Arial"/>
+              <a:sym typeface="Montserrat" pitchFamily="18" charset="0"/>
+            </a:endParaRPr>
+          </a:p>
+          <a:p>
+            <a:pPr marL="133350" indent="0" algn="l" rtl="0">
+              <a:lnSpc>
+                <a:spcPct val="100000"/>
+              </a:lnSpc>
+              <a:spcBef>
+                <a:spcPts val="0"/>
+              </a:spcBef>
+              <a:spcAft>
+                <a:spcPts val="0"/>
+              </a:spcAft>
+              <a:buFont typeface="Montserrat" pitchFamily="18" charset="0"/>
+              <a:buNone/>
+            </a:pPr>
+            <a:endParaRPr lang="en-US" sz="1500">
+              <a:solidFill>
+                <a:srgbClr val="0D0D0D"/>
+              </a:solidFill>
+              <a:highlight>
+                <a:srgbClr val="FFFFFF"/>
+              </a:highlight>
+              <a:latin typeface="Arial"/>
+              <a:ea typeface="Arial"/>
+              <a:cs typeface="Arial"/>
+              <a:sym typeface="Montserrat" pitchFamily="18" charset="0"/>
+            </a:endParaRPr>
+          </a:p>
+          <a:p>
+            <a:endParaRPr lang="en-US"/>
+          </a:p>
+        </p:txBody>
+      </p:sp>
+      <p:sp>
+        <p:nvSpPr>
+          <p:cNvPr id="93" name="BoîteDeDialogue 92"/>
+          <p:cNvSpPr txBox="1"/>
+          <p:nvPr/>
+        </p:nvSpPr>
+        <p:spPr>
+          <a:xfrm>
+            <a:off x="34654" y="4384293"/>
+            <a:ext cx="8691461" cy="987807"/>
+          </a:xfrm>
+          <a:prstGeom prst="rect">
+            <a:avLst/>
+          </a:prstGeom>
+          <a:noFill/>
+        </p:spPr>
+        <p:txBody>
+          <a:bodyPr wrap="square" rtlCol="0">
+            <a:spAutoFit/>
+          </a:bodyPr>
+          <a:lstStyle/>
+          <a:p>
+            <a:pPr marL="133350" indent="0" algn="l" rtl="0">
+              <a:lnSpc>
+                <a:spcPct val="100000"/>
+              </a:lnSpc>
+              <a:spcBef>
+                <a:spcPts val="0"/>
+              </a:spcBef>
+              <a:spcAft>
+                <a:spcPts val="0"/>
+              </a:spcAft>
+              <a:buFont typeface="Montserrat" pitchFamily="18" charset="0"/>
+              <a:buNone/>
+            </a:pPr>
+            <a:r>
+              <a:rPr lang="en-US" sz="1500">
+                <a:solidFill>
+                  <a:srgbClr val="0D0D0D"/>
+                </a:solidFill>
+                <a:highlight>
+                  <a:srgbClr val="FFFFFF"/>
+                </a:highlight>
+                <a:latin typeface="Arial"/>
+                <a:ea typeface="Arial"/>
+                <a:cs typeface="Arial"/>
+                <a:sym typeface="Montserrat" pitchFamily="18" charset="0"/>
+              </a:rPr>
+              <a:t>L'objectif de cette réunion sera à la fois de fédérer l'équipe grâce à son aspect ludique, mais aussi de définir des objectifs clairs et réalisable chaque jour en s'appuyant sur les méthodologie Scrum/Agile tout en prenant compte de l'état de chacun.</a:t>
+            </a:r>
+          </a:p>
+          <a:p>
+            <a:endParaRPr lang="en-US"/>
+          </a:p>
+        </p:txBody>
+      </p:sp>
       <p:pic>
         <p:nvPicPr>
-          <p:cNvPr id="115" name="Image 114"/>
+          <p:cNvPr id="94" name="Image 93"/>
           <p:cNvPicPr>
             <a:picLocks noChangeAspect="1"/>
           </p:cNvPicPr>
@@ -14098,123 +15144,15 @@
           </a:stretch>
         </p:blipFill>
         <p:spPr>
-          <a:xfrm>
-            <a:off x="5650550" y="3154176"/>
-            <a:ext cx="1046765" cy="373398"/>
+          <a:xfrm flipH="1">
+            <a:off x="4097365" y="3040534"/>
+            <a:ext cx="1076516" cy="759207"/>
           </a:xfrm>
           <a:prstGeom prst="rect">
             <a:avLst/>
           </a:prstGeom>
         </p:spPr>
       </p:pic>
-      <p:pic>
-        <p:nvPicPr>
-          <p:cNvPr id="116" name="Image 115"/>
-          <p:cNvPicPr>
-            <a:picLocks noChangeAspect="1"/>
-          </p:cNvPicPr>
-          <p:nvPr/>
-        </p:nvPicPr>
-        <p:blipFill>
-          <a:blip r:embed="rId4"/>
-          <a:srcRect/>
-          <a:stretch>
-            <a:fillRect/>
-          </a:stretch>
-        </p:blipFill>
-        <p:spPr>
-          <a:xfrm>
-            <a:off x="1112324" y="1989323"/>
-            <a:ext cx="1183872" cy="1164853"/>
-          </a:xfrm>
-          <a:prstGeom prst="rect">
-            <a:avLst/>
-          </a:prstGeom>
-        </p:spPr>
-      </p:pic>
-      <p:pic>
-        <p:nvPicPr>
-          <p:cNvPr id="117" name="Image 116"/>
-          <p:cNvPicPr>
-            <a:picLocks noChangeAspect="1"/>
-          </p:cNvPicPr>
-          <p:nvPr/>
-        </p:nvPicPr>
-        <p:blipFill>
-          <a:blip r:embed="rId5"/>
-          <a:srcRect/>
-          <a:stretch>
-            <a:fillRect/>
-          </a:stretch>
-        </p:blipFill>
-        <p:spPr>
-          <a:xfrm>
-            <a:off x="1596211" y="3182033"/>
-            <a:ext cx="415313" cy="345541"/>
-          </a:xfrm>
-          <a:prstGeom prst="rect">
-            <a:avLst/>
-          </a:prstGeom>
-        </p:spPr>
-      </p:pic>
-      <p:sp>
-        <p:nvSpPr>
-          <p:cNvPr id="120" name="BoîteDeDialogue 119"/>
-          <p:cNvSpPr txBox="1"/>
-          <p:nvPr/>
-        </p:nvSpPr>
-        <p:spPr>
-          <a:xfrm>
-            <a:off x="354561" y="3667377"/>
-            <a:ext cx="3406614" cy="545648"/>
-          </a:xfrm>
-          <a:prstGeom prst="rect">
-            <a:avLst/>
-          </a:prstGeom>
-          <a:noFill/>
-        </p:spPr>
-        <p:txBody>
-          <a:bodyPr wrap="square" rtlCol="0">
-            <a:spAutoFit/>
-          </a:bodyPr>
-          <a:lstStyle/>
-          <a:p>
-            <a:r>
-              <a:rPr lang="en-US" sz="1500"/>
-              <a:t>Git est un outil de versionning permettant le contrôle des versions.</a:t>
-            </a:r>
-          </a:p>
-        </p:txBody>
-      </p:sp>
-      <p:sp>
-        <p:nvSpPr>
-          <p:cNvPr id="121" name="BoîteDeDialogue 120"/>
-          <p:cNvSpPr txBox="1"/>
-          <p:nvPr/>
-        </p:nvSpPr>
-        <p:spPr>
-          <a:xfrm>
-            <a:off x="4221618" y="3667377"/>
-            <a:ext cx="3904627" cy="1231448"/>
-          </a:xfrm>
-          <a:prstGeom prst="rect">
-            <a:avLst/>
-          </a:prstGeom>
-          <a:noFill/>
-        </p:spPr>
-        <p:txBody>
-          <a:bodyPr wrap="square" rtlCol="0">
-            <a:spAutoFit/>
-          </a:bodyPr>
-          <a:lstStyle/>
-          <a:p>
-            <a:r>
-              <a:rPr lang="en-US" sz="1500"/>
-              <a:t>GitHub est une plateforme d'hébergement et de partage de code source il permettra à nos développeurs de partager leur travail tous en pouvant se reposer sur la puissance du versionning de Git</a:t>
-            </a:r>
-          </a:p>
-        </p:txBody>
-      </p:sp>
     </p:spTree>
   </p:cSld>
   <p:clrMapOvr>

</xml_diff>